<commit_message>
Refactored some of the code and made a few slide modifications
</commit_message>
<xml_diff>
--- a/5 Best Practices for F# Development.pptx
+++ b/5 Best Practices for F# Development.pptx
@@ -5,10 +5,10 @@
     <p:sldMasterId id="2147483648" r:id="rId1"/>
   </p:sldMasterIdLst>
   <p:notesMasterIdLst>
-    <p:notesMasterId r:id="rId22"/>
+    <p:notesMasterId r:id="rId23"/>
   </p:notesMasterIdLst>
   <p:handoutMasterIdLst>
-    <p:handoutMasterId r:id="rId23"/>
+    <p:handoutMasterId r:id="rId24"/>
   </p:handoutMasterIdLst>
   <p:sldIdLst>
     <p:sldId id="319" r:id="rId2"/>
@@ -22,15 +22,16 @@
     <p:sldId id="353" r:id="rId10"/>
     <p:sldId id="334" r:id="rId11"/>
     <p:sldId id="355" r:id="rId12"/>
-    <p:sldId id="356" r:id="rId13"/>
-    <p:sldId id="349" r:id="rId14"/>
-    <p:sldId id="348" r:id="rId15"/>
-    <p:sldId id="351" r:id="rId16"/>
-    <p:sldId id="357" r:id="rId17"/>
-    <p:sldId id="350" r:id="rId18"/>
-    <p:sldId id="352" r:id="rId19"/>
-    <p:sldId id="358" r:id="rId20"/>
-    <p:sldId id="345" r:id="rId21"/>
+    <p:sldId id="349" r:id="rId13"/>
+    <p:sldId id="359" r:id="rId14"/>
+    <p:sldId id="360" r:id="rId15"/>
+    <p:sldId id="348" r:id="rId16"/>
+    <p:sldId id="351" r:id="rId17"/>
+    <p:sldId id="357" r:id="rId18"/>
+    <p:sldId id="350" r:id="rId19"/>
+    <p:sldId id="352" r:id="rId20"/>
+    <p:sldId id="358" r:id="rId21"/>
+    <p:sldId id="345" r:id="rId22"/>
   </p:sldIdLst>
   <p:sldSz cx="9144000" cy="6858000" type="screen4x3"/>
   <p:notesSz cx="6858000" cy="9144000"/>
@@ -215,7 +216,7 @@
             <a:fld id="{68F88C59-319B-4332-9A1D-2A62CFCB00D8}" type="datetimeFigureOut">
               <a:rPr lang="en-US" smtClean="0"/>
               <a:pPr/>
-              <a:t>6/9/2010</a:t>
+              <a:t>6/12/2010</a:t>
             </a:fld>
             <a:endParaRPr lang="en-US"/>
           </a:p>
@@ -381,7 +382,7 @@
             <a:fld id="{968B300D-05F0-4B43-940D-46DED5A791AD}" type="datetimeFigureOut">
               <a:rPr lang="en-US" smtClean="0"/>
               <a:pPr/>
-              <a:t>6/9/2010</a:t>
+              <a:t>6/12/2010</a:t>
             </a:fld>
             <a:endParaRPr lang="en-US"/>
           </a:p>
@@ -1051,7 +1052,7 @@
             <a:fld id="{9B26CD33-4337-4529-948A-94F6960B2374}" type="slidenum">
               <a:rPr lang="en-US" smtClean="0"/>
               <a:pPr/>
-              <a:t>14</a:t>
+              <a:t>15</a:t>
             </a:fld>
             <a:endParaRPr lang="en-US"/>
           </a:p>
@@ -1133,7 +1134,7 @@
             <a:fld id="{9B26CD33-4337-4529-948A-94F6960B2374}" type="slidenum">
               <a:rPr lang="en-US" smtClean="0"/>
               <a:pPr/>
-              <a:t>17</a:t>
+              <a:t>18</a:t>
             </a:fld>
             <a:endParaRPr lang="en-US"/>
           </a:p>
@@ -1447,7 +1448,7 @@
                 </a:solidFill>
               </a:rPr>
               <a:pPr/>
-              <a:t>6/9/2010</a:t>
+              <a:t>6/12/2010</a:t>
             </a:fld>
             <a:endParaRPr lang="en-US"/>
           </a:p>
@@ -1875,7 +1876,7 @@
                 </a:solidFill>
               </a:rPr>
               <a:pPr/>
-              <a:t>6/9/2010</a:t>
+              <a:t>6/12/2010</a:t>
             </a:fld>
             <a:endParaRPr lang="en-US"/>
           </a:p>
@@ -2246,7 +2247,7 @@
                 </a:solidFill>
               </a:rPr>
               <a:pPr/>
-              <a:t>6/9/2010</a:t>
+              <a:t>6/12/2010</a:t>
             </a:fld>
             <a:endParaRPr lang="en-US"/>
           </a:p>
@@ -2851,7 +2852,7 @@
                 </a:solidFill>
               </a:rPr>
               <a:pPr/>
-              <a:t>6/9/2010</a:t>
+              <a:t>6/12/2010</a:t>
             </a:fld>
             <a:endParaRPr lang="en-US"/>
           </a:p>
@@ -3437,7 +3438,7 @@
                 </a:solidFill>
               </a:rPr>
               <a:pPr/>
-              <a:t>6/9/2010</a:t>
+              <a:t>6/12/2010</a:t>
             </a:fld>
             <a:endParaRPr lang="en-US"/>
           </a:p>
@@ -3915,7 +3916,7 @@
                 </a:solidFill>
               </a:rPr>
               <a:pPr/>
-              <a:t>6/9/2010</a:t>
+              <a:t>6/12/2010</a:t>
             </a:fld>
             <a:endParaRPr lang="en-US"/>
           </a:p>
@@ -4357,7 +4358,7 @@
                 </a:solidFill>
               </a:rPr>
               <a:pPr/>
-              <a:t>6/9/2010</a:t>
+              <a:t>6/12/2010</a:t>
             </a:fld>
             <a:endParaRPr lang="en-US"/>
           </a:p>
@@ -4882,7 +4883,7 @@
                 </a:solidFill>
               </a:rPr>
               <a:pPr/>
-              <a:t>6/9/2010</a:t>
+              <a:t>6/12/2010</a:t>
             </a:fld>
             <a:endParaRPr lang="en-US"/>
           </a:p>
@@ -5407,7 +5408,7 @@
                 </a:solidFill>
               </a:rPr>
               <a:pPr/>
-              <a:t>6/9/2010</a:t>
+              <a:t>6/12/2010</a:t>
             </a:fld>
             <a:endParaRPr lang="en-US"/>
           </a:p>
@@ -5636,7 +5637,7 @@
                 </a:solidFill>
               </a:rPr>
               <a:pPr/>
-              <a:t>6/9/2010</a:t>
+              <a:t>6/12/2010</a:t>
             </a:fld>
             <a:endParaRPr lang="en-US"/>
           </a:p>
@@ -5984,7 +5985,7 @@
                 </a:solidFill>
               </a:rPr>
               <a:pPr/>
-              <a:t>6/9/2010</a:t>
+              <a:t>6/12/2010</a:t>
             </a:fld>
             <a:endParaRPr lang="en-US"/>
           </a:p>
@@ -6230,7 +6231,7 @@
                 </a:solidFill>
               </a:rPr>
               <a:pPr/>
-              <a:t>6/9/2010</a:t>
+              <a:t>6/12/2010</a:t>
             </a:fld>
             <a:endParaRPr lang="en-US"/>
           </a:p>
@@ -6459,7 +6460,7 @@
                 </a:solidFill>
               </a:rPr>
               <a:pPr/>
-              <a:t>6/9/2010</a:t>
+              <a:t>6/12/2010</a:t>
             </a:fld>
             <a:endParaRPr lang="en-US"/>
           </a:p>
@@ -6644,7 +6645,7 @@
             <a:fld id="{ACB2EC6F-6501-4E04-BD6C-A8A6CABB2C5B}" type="datetimeFigureOut">
               <a:rPr lang="en-US" smtClean="0"/>
               <a:pPr/>
-              <a:t>6/9/2010</a:t>
+              <a:t>6/12/2010</a:t>
             </a:fld>
             <a:endParaRPr lang="en-US"/>
           </a:p>
@@ -6902,7 +6903,7 @@
                 </a:solidFill>
               </a:rPr>
               <a:pPr/>
-              <a:t>6/9/2010</a:t>
+              <a:t>6/12/2010</a:t>
             </a:fld>
             <a:endParaRPr lang="en-US"/>
           </a:p>
@@ -7397,7 +7398,7 @@
                 </a:solidFill>
               </a:rPr>
               <a:pPr/>
-              <a:t>6/9/2010</a:t>
+              <a:t>6/12/2010</a:t>
             </a:fld>
             <a:endParaRPr lang="en-US"/>
           </a:p>
@@ -7769,7 +7770,7 @@
                 </a:solidFill>
               </a:rPr>
               <a:pPr/>
-              <a:t>6/9/2010</a:t>
+              <a:t>6/12/2010</a:t>
             </a:fld>
             <a:endParaRPr lang="en-US"/>
           </a:p>
@@ -8141,7 +8142,7 @@
                 </a:solidFill>
               </a:rPr>
               <a:pPr/>
-              <a:t>6/9/2010</a:t>
+              <a:t>6/12/2010</a:t>
             </a:fld>
             <a:endParaRPr lang="en-US"/>
           </a:p>
@@ -8473,7 +8474,7 @@
                 </a:solidFill>
               </a:rPr>
               <a:pPr/>
-              <a:t>6/9/2010</a:t>
+              <a:t>6/12/2010</a:t>
             </a:fld>
             <a:endParaRPr lang="en-US"/>
           </a:p>
@@ -8995,7 +8996,7 @@
                 </a:solidFill>
               </a:rPr>
               <a:pPr/>
-              <a:t>6/9/2010</a:t>
+              <a:t>6/12/2010</a:t>
             </a:fld>
             <a:endParaRPr lang="en-US"/>
           </a:p>
@@ -9224,7 +9225,7 @@
                 </a:solidFill>
               </a:rPr>
               <a:pPr/>
-              <a:t>6/9/2010</a:t>
+              <a:t>6/12/2010</a:t>
             </a:fld>
             <a:endParaRPr lang="en-US" sz="1200" dirty="0">
               <a:solidFill>
@@ -10115,29 +10116,7 @@
                   </a:schemeClr>
                 </a:solidFill>
               </a:rPr>
-              <a:t>1.  Without it, </a:t>
-            </a:r>
-            <a:r>
-              <a:rPr lang="en-US" sz="2400" dirty="0" smtClean="0">
-                <a:solidFill>
-                  <a:schemeClr val="accent4">
-                    <a:lumMod val="60000"/>
-                    <a:lumOff val="40000"/>
-                  </a:schemeClr>
-                </a:solidFill>
-              </a:rPr>
-              <a:t>there’s a risk </a:t>
-            </a:r>
-            <a:r>
-              <a:rPr lang="en-US" sz="2400" dirty="0" smtClean="0">
-                <a:solidFill>
-                  <a:schemeClr val="accent4">
-                    <a:lumMod val="60000"/>
-                    <a:lumOff val="40000"/>
-                  </a:schemeClr>
-                </a:solidFill>
-              </a:rPr>
-              <a:t>for a stack overflow</a:t>
+              <a:t>1.  Without it, there’s a risk for a stack overflow</a:t>
             </a:r>
             <a:endParaRPr lang="en-US" sz="2400" dirty="0">
               <a:solidFill>
@@ -10354,7 +10333,7 @@
         <p:spPr bwMode="auto">
           <a:xfrm>
             <a:off x="1235075" y="2438400"/>
-            <a:ext cx="2603598" cy="461665"/>
+            <a:ext cx="5965095" cy="461665"/>
           </a:xfrm>
           <a:prstGeom prst="rect">
             <a:avLst/>
@@ -10383,7 +10362,7 @@
                   </a:schemeClr>
                 </a:solidFill>
               </a:rPr>
-              <a:t>1.  What is TCO?</a:t>
+              <a:t>1.  Tail Recursive vs. Non-Tail Recursive</a:t>
             </a:r>
             <a:endParaRPr lang="en-US" sz="2400" dirty="0">
               <a:solidFill>
@@ -10407,7 +10386,7 @@
         <p:spPr bwMode="auto">
           <a:xfrm>
             <a:off x="1225550" y="3033713"/>
-            <a:ext cx="3206327" cy="830997"/>
+            <a:ext cx="5511445" cy="830997"/>
           </a:xfrm>
           <a:prstGeom prst="rect">
             <a:avLst/>
@@ -10436,7 +10415,7 @@
                   </a:schemeClr>
                 </a:solidFill>
               </a:rPr>
-              <a:t>2.  How does it work?</a:t>
+              <a:t>2.  Polyphony (Join the Node Cluster)</a:t>
             </a:r>
           </a:p>
           <a:p>
@@ -10510,30 +10489,7 @@
                 <a:ea typeface="+mj-ea"/>
                 <a:cs typeface="+mj-cs"/>
               </a:rPr>
-              <a:t>A side note</a:t>
-            </a:r>
-            <a:r>
-              <a:rPr kumimoji="0" lang="en-US" sz="4000" b="0" i="0" u="none" strike="noStrike" kern="0" cap="all" spc="0" normalizeH="0" noProof="0" dirty="0" smtClean="0">
-                <a:ln>
-                  <a:noFill/>
-                </a:ln>
-                <a:solidFill>
-                  <a:schemeClr val="tx2"/>
-                </a:solidFill>
-                <a:effectLst>
-                  <a:outerShdw blurRad="51000" dist="37000" dir="5400000" algn="tl" rotWithShape="0">
-                    <a:srgbClr val="000000">
-                      <a:alpha val="25000"/>
-                    </a:srgbClr>
-                  </a:outerShdw>
-                </a:effectLst>
-                <a:uLnTx/>
-                <a:uFillTx/>
-                <a:latin typeface="+mj-lt"/>
-                <a:ea typeface="+mj-ea"/>
-                <a:cs typeface="+mj-cs"/>
-              </a:rPr>
-              <a:t> on TCO</a:t>
+              <a:t>Examples</a:t>
             </a:r>
             <a:endParaRPr kumimoji="0" lang="en-US" sz="4000" b="0" i="0" u="none" strike="noStrike" kern="0" cap="all" spc="0" normalizeH="0" baseline="0" noProof="0" dirty="0">
               <a:ln>
@@ -10614,114 +10570,6 @@
       </p:sp>
       <p:sp>
         <p:nvSpPr>
-          <p:cNvPr id="9" name="Text Box 16"/>
-          <p:cNvSpPr txBox="1">
-            <a:spLocks noChangeArrowheads="1"/>
-          </p:cNvSpPr>
-          <p:nvPr/>
-        </p:nvSpPr>
-        <p:spPr bwMode="auto">
-          <a:xfrm>
-            <a:off x="1235075" y="2438400"/>
-            <a:ext cx="5965095" cy="461665"/>
-          </a:xfrm>
-          <a:prstGeom prst="rect">
-            <a:avLst/>
-          </a:prstGeom>
-          <a:noFill/>
-          <a:ln w="9525">
-            <a:noFill/>
-            <a:miter lim="800000"/>
-            <a:headEnd/>
-            <a:tailEnd/>
-          </a:ln>
-          <a:effectLst/>
-        </p:spPr>
-        <p:txBody>
-          <a:bodyPr wrap="none">
-            <a:spAutoFit/>
-          </a:bodyPr>
-          <a:lstStyle/>
-          <a:p>
-            <a:r>
-              <a:rPr lang="en-US" sz="2400" dirty="0" smtClean="0">
-                <a:solidFill>
-                  <a:schemeClr val="accent4">
-                    <a:lumMod val="60000"/>
-                    <a:lumOff val="40000"/>
-                  </a:schemeClr>
-                </a:solidFill>
-              </a:rPr>
-              <a:t>1.  Tail Recursive vs. Non-Tail Recursive</a:t>
-            </a:r>
-            <a:endParaRPr lang="en-US" sz="2400" dirty="0">
-              <a:solidFill>
-                <a:schemeClr val="accent4">
-                  <a:lumMod val="60000"/>
-                  <a:lumOff val="40000"/>
-                </a:schemeClr>
-              </a:solidFill>
-            </a:endParaRPr>
-          </a:p>
-        </p:txBody>
-      </p:sp>
-      <p:sp>
-        <p:nvSpPr>
-          <p:cNvPr id="10" name="Text Box 17"/>
-          <p:cNvSpPr txBox="1">
-            <a:spLocks noChangeArrowheads="1"/>
-          </p:cNvSpPr>
-          <p:nvPr/>
-        </p:nvSpPr>
-        <p:spPr bwMode="auto">
-          <a:xfrm>
-            <a:off x="1225550" y="3033713"/>
-            <a:ext cx="5511445" cy="830997"/>
-          </a:xfrm>
-          <a:prstGeom prst="rect">
-            <a:avLst/>
-          </a:prstGeom>
-          <a:noFill/>
-          <a:ln w="9525">
-            <a:noFill/>
-            <a:miter lim="800000"/>
-            <a:headEnd/>
-            <a:tailEnd/>
-          </a:ln>
-          <a:effectLst/>
-        </p:spPr>
-        <p:txBody>
-          <a:bodyPr wrap="none">
-            <a:spAutoFit/>
-          </a:bodyPr>
-          <a:lstStyle/>
-          <a:p>
-            <a:r>
-              <a:rPr lang="en-US" sz="2400" dirty="0" smtClean="0">
-                <a:solidFill>
-                  <a:schemeClr val="accent4">
-                    <a:lumMod val="60000"/>
-                    <a:lumOff val="40000"/>
-                  </a:schemeClr>
-                </a:solidFill>
-              </a:rPr>
-              <a:t>2.  Polyphony (Join the Node Cluster)</a:t>
-            </a:r>
-          </a:p>
-          <a:p>
-            <a:endParaRPr lang="en-US" sz="2400" dirty="0">
-              <a:solidFill>
-                <a:schemeClr val="accent4">
-                  <a:lumMod val="60000"/>
-                  <a:lumOff val="40000"/>
-                </a:schemeClr>
-              </a:solidFill>
-            </a:endParaRPr>
-          </a:p>
-        </p:txBody>
-      </p:sp>
-      <p:sp>
-        <p:nvSpPr>
           <p:cNvPr id="11" name="Rectangle 6"/>
           <p:cNvSpPr txBox="1">
             <a:spLocks noChangeArrowheads="1"/>
@@ -10759,7 +10607,7 @@
               <a:defRPr/>
             </a:pPr>
             <a:r>
-              <a:rPr kumimoji="0" lang="en-US" sz="4000" b="0" i="0" u="none" strike="noStrike" kern="0" cap="all" spc="0" normalizeH="0" baseline="0" noProof="0" dirty="0" smtClean="0">
+              <a:rPr kumimoji="0" lang="en-US" sz="4000" b="0" i="0" u="none" strike="noStrike" kern="0" cap="all" spc="0" normalizeH="0" noProof="0" dirty="0" smtClean="0">
                 <a:ln>
                   <a:noFill/>
                 </a:ln>
@@ -10779,7 +10627,7 @@
                 <a:ea typeface="+mj-ea"/>
                 <a:cs typeface="+mj-cs"/>
               </a:rPr>
-              <a:t>Examples</a:t>
+              <a:t>Verifying tail recursion</a:t>
             </a:r>
             <a:endParaRPr kumimoji="0" lang="en-US" sz="4000" b="0" i="0" u="none" strike="noStrike" kern="0" cap="all" spc="0" normalizeH="0" baseline="0" noProof="0" dirty="0">
               <a:ln>
@@ -10801,6 +10649,127 @@
               <a:ea typeface="+mj-ea"/>
               <a:cs typeface="+mj-cs"/>
             </a:endParaRPr>
+          </a:p>
+        </p:txBody>
+      </p:sp>
+      <p:sp>
+        <p:nvSpPr>
+          <p:cNvPr id="8" name="Rectangle 7"/>
+          <p:cNvSpPr/>
+          <p:nvPr/>
+        </p:nvSpPr>
+        <p:spPr>
+          <a:xfrm>
+            <a:off x="5486400" y="4953000"/>
+            <a:ext cx="3005951" cy="369332"/>
+          </a:xfrm>
+          <a:prstGeom prst="rect">
+            <a:avLst/>
+          </a:prstGeom>
+        </p:spPr>
+        <p:txBody>
+          <a:bodyPr wrap="none">
+            <a:spAutoFit/>
+          </a:bodyPr>
+          <a:lstStyle/>
+          <a:p>
+            <a:pPr lvl="0">
+              <a:spcBef>
+                <a:spcPct val="0"/>
+              </a:spcBef>
+              <a:defRPr/>
+            </a:pPr>
+            <a:r>
+              <a:rPr lang="en-US" b="1" kern="0" cap="all" dirty="0" smtClean="0">
+                <a:solidFill>
+                  <a:srgbClr val="FF0000"/>
+                </a:solidFill>
+                <a:effectLst>
+                  <a:outerShdw blurRad="51000" dist="37000" dir="5400000" algn="tl" rotWithShape="0">
+                    <a:srgbClr val="000000">
+                      <a:alpha val="25000"/>
+                    </a:srgbClr>
+                  </a:outerShdw>
+                </a:effectLst>
+              </a:rPr>
+              <a:t>Not tail recursive</a:t>
+            </a:r>
+            <a:endParaRPr lang="en-US" b="1" kern="0" cap="all" dirty="0">
+              <a:solidFill>
+                <a:srgbClr val="FF0000"/>
+              </a:solidFill>
+              <a:effectLst>
+                <a:outerShdw blurRad="51000" dist="37000" dir="5400000" algn="tl" rotWithShape="0">
+                  <a:srgbClr val="000000">
+                    <a:alpha val="25000"/>
+                  </a:srgbClr>
+                </a:outerShdw>
+              </a:effectLst>
+            </a:endParaRPr>
+          </a:p>
+        </p:txBody>
+      </p:sp>
+      <p:pic>
+        <p:nvPicPr>
+          <p:cNvPr id="12" name="Picture 11" descr="NoneTailRecursive.png"/>
+          <p:cNvPicPr>
+            <a:picLocks noChangeAspect="1"/>
+          </p:cNvPicPr>
+          <p:nvPr/>
+        </p:nvPicPr>
+        <p:blipFill>
+          <a:blip r:embed="rId2" cstate="print"/>
+          <a:stretch>
+            <a:fillRect/>
+          </a:stretch>
+        </p:blipFill>
+        <p:spPr>
+          <a:xfrm>
+            <a:off x="233460" y="2119005"/>
+            <a:ext cx="8678754" cy="2338512"/>
+          </a:xfrm>
+          <a:prstGeom prst="rect">
+            <a:avLst/>
+          </a:prstGeom>
+        </p:spPr>
+      </p:pic>
+      <p:sp>
+        <p:nvSpPr>
+          <p:cNvPr id="7" name="Left Arrow 6"/>
+          <p:cNvSpPr/>
+          <p:nvPr/>
+        </p:nvSpPr>
+        <p:spPr>
+          <a:xfrm rot="7636457">
+            <a:off x="6717896" y="4256120"/>
+            <a:ext cx="978408" cy="484632"/>
+          </a:xfrm>
+          <a:prstGeom prst="leftArrow">
+            <a:avLst/>
+          </a:prstGeom>
+        </p:spPr>
+        <p:style>
+          <a:lnRef idx="2">
+            <a:schemeClr val="accent1">
+              <a:shade val="50000"/>
+            </a:schemeClr>
+          </a:lnRef>
+          <a:fillRef idx="1">
+            <a:schemeClr val="accent1"/>
+          </a:fillRef>
+          <a:effectRef idx="0">
+            <a:schemeClr val="accent1"/>
+          </a:effectRef>
+          <a:fontRef idx="minor">
+            <a:schemeClr val="lt1"/>
+          </a:fontRef>
+        </p:style>
+        <p:txBody>
+          <a:bodyPr rtlCol="0" anchor="ctr"/>
+          <a:lstStyle/>
+          <a:p>
+            <a:pPr algn="ctr"/>
+            <a:endParaRPr lang="en-US"/>
           </a:p>
         </p:txBody>
       </p:sp>
@@ -10839,128 +10808,50 @@
           <a:chExt cx="0" cy="0"/>
         </a:xfrm>
       </p:grpSpPr>
-      <p:pic>
-        <p:nvPicPr>
-          <p:cNvPr id="10" name="Octagon 9"/>
-          <p:cNvPicPr>
-            <a:picLocks noGrp="1" noChangeAspect="1"/>
-          </p:cNvPicPr>
-          <p:nvPr>
-            <p:ph type="pic" sz="quarter" idx="12"/>
-          </p:nvPr>
-        </p:nvPicPr>
-        <p:blipFill>
-          <a:blip r:embed="rId3" cstate="print"/>
-          <a:srcRect l="12500" r="12500"/>
-          <a:stretch>
-            <a:fillRect/>
-          </a:stretch>
-        </p:blipFill>
+      <p:sp>
+        <p:nvSpPr>
+          <p:cNvPr id="3" name="Text Placeholder 2"/>
+          <p:cNvSpPr>
+            <a:spLocks noGrp="1"/>
+          </p:cNvSpPr>
+          <p:nvPr>
+            <p:ph type="body" sz="quarter" idx="11"/>
+          </p:nvPr>
+        </p:nvSpPr>
+        <p:spPr/>
+        <p:txBody>
+          <a:bodyPr/>
+          <a:lstStyle/>
+          <a:p>
+            <a:endParaRPr lang="en-US"/>
+          </a:p>
+        </p:txBody>
+      </p:sp>
+      <p:sp>
+        <p:nvSpPr>
+          <p:cNvPr id="11" name="Rectangle 6"/>
+          <p:cNvSpPr txBox="1">
+            <a:spLocks noChangeArrowheads="1"/>
+          </p:cNvSpPr>
+          <p:nvPr/>
+        </p:nvSpPr>
         <p:spPr>
           <a:xfrm>
-            <a:off x="381000" y="1066800"/>
-            <a:ext cx="4114800" cy="5486400"/>
+            <a:off x="304800" y="304800"/>
+            <a:ext cx="8839200" cy="838200"/>
           </a:xfrm>
           <a:prstGeom prst="rect">
             <a:avLst/>
           </a:prstGeom>
-          <a:noFill/>
-          <a:ln w="19050" cap="rnd" cmpd="sng" algn="ctr">
-            <a:solidFill>
-              <a:schemeClr val="tx1"/>
-            </a:solidFill>
-            <a:prstDash val="solid"/>
-            <a:miter lim="800000"/>
-          </a:ln>
-          <a:effectLst>
-            <a:innerShdw blurRad="50800" dist="50800" dir="13500000">
-              <a:srgbClr val="000000">
-                <a:alpha val="60000"/>
-              </a:srgbClr>
-            </a:innerShdw>
-          </a:effectLst>
-        </p:spPr>
-      </p:pic>
-      <p:sp>
-        <p:nvSpPr>
-          <p:cNvPr id="11" name="W¥ل云玗İαЂÕØÚáÛ丫:Téxt Plàçèhòlðêr 表¥鷗字㌍_W 10"/>
-          <p:cNvSpPr>
-            <a:spLocks noGrp="1"/>
-          </p:cNvSpPr>
-          <p:nvPr>
-            <p:ph type="body" sz="quarter" idx="13"/>
-          </p:nvPr>
-        </p:nvSpPr>
-        <p:spPr>
-          <a:xfrm>
-            <a:off x="4876800" y="1447800"/>
-            <a:ext cx="3962400" cy="5410200"/>
-          </a:xfrm>
-        </p:spPr>
-        <p:txBody>
-          <a:bodyPr/>
-          <a:lstStyle>
-            <a:extLst/>
-          </a:lstStyle>
-          <a:p>
-            <a:endParaRPr lang="en-US" dirty="0" smtClean="0"/>
-          </a:p>
-          <a:p>
-            <a:endParaRPr lang="en-US" dirty="0" smtClean="0"/>
-          </a:p>
-          <a:p>
-            <a:r>
-              <a:rPr lang="en-US" sz="2400" dirty="0" smtClean="0"/>
-              <a:t>Prefer active patterns over multiple ‘when guards’ during pattern matching.</a:t>
-            </a:r>
-          </a:p>
-          <a:p>
-            <a:endParaRPr lang="en-US" dirty="0" smtClean="0"/>
-          </a:p>
-          <a:p>
-            <a:endParaRPr lang="en-US" dirty="0" smtClean="0"/>
-          </a:p>
-          <a:p>
-            <a:endParaRPr lang="en-US" dirty="0" smtClean="0"/>
-          </a:p>
-        </p:txBody>
-      </p:sp>
-      <p:sp>
-        <p:nvSpPr>
-          <p:cNvPr id="6" name="Rectangle 6"/>
-          <p:cNvSpPr txBox="1">
-            <a:spLocks noChangeArrowheads="1"/>
-          </p:cNvSpPr>
-          <p:nvPr/>
-        </p:nvSpPr>
-        <p:spPr>
-          <a:xfrm>
-            <a:off x="304800" y="304800"/>
-            <a:ext cx="8839200" cy="838200"/>
-          </a:xfrm>
-          <a:prstGeom prst="rect">
-            <a:avLst/>
-          </a:prstGeom>
         </p:spPr>
         <p:txBody>
           <a:bodyPr/>
           <a:lstStyle/>
           <a:p>
-            <a:pPr marL="0" marR="0" lvl="0" indent="0" algn="l" defTabSz="914400" rtl="0" eaLnBrk="1" fontAlgn="auto" latinLnBrk="0" hangingPunct="1">
-              <a:lnSpc>
-                <a:spcPct val="100000"/>
-              </a:lnSpc>
+            <a:pPr lvl="0">
               <a:spcBef>
                 <a:spcPct val="0"/>
               </a:spcBef>
-              <a:spcAft>
-                <a:spcPts val="0"/>
-              </a:spcAft>
-              <a:buClrTx/>
-              <a:buSzTx/>
-              <a:buFontTx/>
-              <a:buNone/>
-              <a:tabLst/>
               <a:defRPr/>
             </a:pPr>
             <a:r>
@@ -10975,34 +10866,10 @@
                     </a:srgbClr>
                   </a:outerShdw>
                 </a:effectLst>
-                <a:latin typeface="+mj-lt"/>
-                <a:ea typeface="+mj-ea"/>
-                <a:cs typeface="+mj-cs"/>
               </a:rPr>
-              <a:t>Active </a:t>
-            </a:r>
-            <a:r>
-              <a:rPr lang="en-US" sz="4000" kern="0" cap="all" dirty="0" smtClean="0">
-                <a:solidFill>
-                  <a:schemeClr val="tx2"/>
-                </a:solidFill>
-                <a:effectLst>
-                  <a:outerShdw blurRad="51000" dist="37000" dir="5400000" algn="tl" rotWithShape="0">
-                    <a:srgbClr val="000000">
-                      <a:alpha val="25000"/>
-                    </a:srgbClr>
-                  </a:outerShdw>
-                </a:effectLst>
-                <a:latin typeface="+mj-lt"/>
-                <a:ea typeface="+mj-ea"/>
-                <a:cs typeface="+mj-cs"/>
-              </a:rPr>
-              <a:t>patterns</a:t>
-            </a:r>
-            <a:endParaRPr kumimoji="0" lang="en-US" sz="4000" b="0" i="0" u="none" strike="noStrike" kern="0" cap="all" spc="0" normalizeH="0" baseline="0" noProof="0" dirty="0">
-              <a:ln>
-                <a:noFill/>
-              </a:ln>
+              <a:t>Verifying tail recursion</a:t>
+            </a:r>
+            <a:endParaRPr lang="en-US" sz="4000" kern="0" cap="all" dirty="0">
               <a:solidFill>
                 <a:schemeClr val="tx2"/>
               </a:solidFill>
@@ -11013,11 +10880,127 @@
                   </a:srgbClr>
                 </a:outerShdw>
               </a:effectLst>
-              <a:uLnTx/>
-              <a:uFillTx/>
-              <a:latin typeface="+mj-lt"/>
-              <a:ea typeface="+mj-ea"/>
-              <a:cs typeface="+mj-cs"/>
+            </a:endParaRPr>
+          </a:p>
+        </p:txBody>
+      </p:sp>
+      <p:pic>
+        <p:nvPicPr>
+          <p:cNvPr id="6" name="Picture 5" descr="TailRecursiveIL.png"/>
+          <p:cNvPicPr>
+            <a:picLocks noChangeAspect="1"/>
+          </p:cNvPicPr>
+          <p:nvPr/>
+        </p:nvPicPr>
+        <p:blipFill>
+          <a:blip r:embed="rId2" cstate="print"/>
+          <a:stretch>
+            <a:fillRect/>
+          </a:stretch>
+        </p:blipFill>
+        <p:spPr>
+          <a:xfrm>
+            <a:off x="609600" y="2209800"/>
+            <a:ext cx="7934622" cy="3586344"/>
+          </a:xfrm>
+          <a:prstGeom prst="rect">
+            <a:avLst/>
+          </a:prstGeom>
+        </p:spPr>
+      </p:pic>
+      <p:sp>
+        <p:nvSpPr>
+          <p:cNvPr id="7" name="Left Arrow 6"/>
+          <p:cNvSpPr/>
+          <p:nvPr/>
+        </p:nvSpPr>
+        <p:spPr>
+          <a:xfrm rot="18224154">
+            <a:off x="1126995" y="2280283"/>
+            <a:ext cx="978408" cy="484632"/>
+          </a:xfrm>
+          <a:prstGeom prst="leftArrow">
+            <a:avLst/>
+          </a:prstGeom>
+        </p:spPr>
+        <p:style>
+          <a:lnRef idx="2">
+            <a:schemeClr val="accent1">
+              <a:shade val="50000"/>
+            </a:schemeClr>
+          </a:lnRef>
+          <a:fillRef idx="1">
+            <a:schemeClr val="accent1"/>
+          </a:fillRef>
+          <a:effectRef idx="0">
+            <a:schemeClr val="accent1"/>
+          </a:effectRef>
+          <a:fontRef idx="minor">
+            <a:schemeClr val="lt1"/>
+          </a:fontRef>
+        </p:style>
+        <p:txBody>
+          <a:bodyPr rtlCol="0" anchor="ctr"/>
+          <a:lstStyle/>
+          <a:p>
+            <a:pPr algn="ctr"/>
+            <a:endParaRPr lang="en-US"/>
+          </a:p>
+        </p:txBody>
+      </p:sp>
+      <p:sp>
+        <p:nvSpPr>
+          <p:cNvPr id="8" name="Rectangle 7"/>
+          <p:cNvSpPr/>
+          <p:nvPr/>
+        </p:nvSpPr>
+        <p:spPr>
+          <a:xfrm>
+            <a:off x="609600" y="1676400"/>
+            <a:ext cx="2388795" cy="369332"/>
+          </a:xfrm>
+          <a:prstGeom prst="rect">
+            <a:avLst/>
+          </a:prstGeom>
+        </p:spPr>
+        <p:txBody>
+          <a:bodyPr wrap="none">
+            <a:spAutoFit/>
+          </a:bodyPr>
+          <a:lstStyle/>
+          <a:p>
+            <a:pPr lvl="0">
+              <a:spcBef>
+                <a:spcPct val="0"/>
+              </a:spcBef>
+              <a:defRPr/>
+            </a:pPr>
+            <a:r>
+              <a:rPr lang="en-US" b="1" kern="0" cap="all" dirty="0" smtClean="0">
+                <a:solidFill>
+                  <a:srgbClr val="FF0000"/>
+                </a:solidFill>
+                <a:effectLst>
+                  <a:outerShdw blurRad="51000" dist="37000" dir="5400000" algn="tl" rotWithShape="0">
+                    <a:srgbClr val="000000">
+                      <a:alpha val="25000"/>
+                    </a:srgbClr>
+                  </a:outerShdw>
+                </a:effectLst>
+              </a:rPr>
+              <a:t>tail recursive</a:t>
+            </a:r>
+            <a:endParaRPr lang="en-US" b="1" kern="0" cap="all" dirty="0">
+              <a:solidFill>
+                <a:srgbClr val="FF0000"/>
+              </a:solidFill>
+              <a:effectLst>
+                <a:outerShdw blurRad="51000" dist="37000" dir="5400000" algn="tl" rotWithShape="0">
+                  <a:srgbClr val="000000">
+                    <a:alpha val="25000"/>
+                  </a:srgbClr>
+                </a:outerShdw>
+              </a:effectLst>
             </a:endParaRPr>
           </a:p>
         </p:txBody>
@@ -11057,158 +11040,95 @@
           <a:chExt cx="0" cy="0"/>
         </a:xfrm>
       </p:grpSpPr>
-      <p:sp>
-        <p:nvSpPr>
-          <p:cNvPr id="3" name="Text Placeholder 2"/>
-          <p:cNvSpPr>
-            <a:spLocks noGrp="1"/>
-          </p:cNvSpPr>
-          <p:nvPr>
-            <p:ph type="body" sz="quarter" idx="11"/>
-          </p:nvPr>
-        </p:nvSpPr>
-        <p:spPr/>
-        <p:txBody>
-          <a:bodyPr/>
-          <a:lstStyle/>
-          <a:p>
-            <a:endParaRPr lang="en-US"/>
-          </a:p>
-        </p:txBody>
-      </p:sp>
-      <p:sp>
-        <p:nvSpPr>
-          <p:cNvPr id="9" name="Text Box 16"/>
-          <p:cNvSpPr txBox="1">
-            <a:spLocks noChangeArrowheads="1"/>
-          </p:cNvSpPr>
-          <p:nvPr/>
-        </p:nvSpPr>
-        <p:spPr bwMode="auto">
-          <a:xfrm>
-            <a:off x="1235075" y="2438400"/>
-            <a:ext cx="4376519" cy="461665"/>
+      <p:pic>
+        <p:nvPicPr>
+          <p:cNvPr id="10" name="Octagon 9"/>
+          <p:cNvPicPr>
+            <a:picLocks noGrp="1" noChangeAspect="1"/>
+          </p:cNvPicPr>
+          <p:nvPr>
+            <p:ph type="pic" sz="quarter" idx="12"/>
+          </p:nvPr>
+        </p:nvPicPr>
+        <p:blipFill>
+          <a:blip r:embed="rId3" cstate="print"/>
+          <a:srcRect l="12500" r="12500"/>
+          <a:stretch>
+            <a:fillRect/>
+          </a:stretch>
+        </p:blipFill>
+        <p:spPr>
+          <a:xfrm>
+            <a:off x="381000" y="1066800"/>
+            <a:ext cx="4114800" cy="5486400"/>
           </a:xfrm>
           <a:prstGeom prst="rect">
             <a:avLst/>
           </a:prstGeom>
           <a:noFill/>
-          <a:ln w="9525">
-            <a:noFill/>
+          <a:ln w="19050" cap="rnd" cmpd="sng" algn="ctr">
+            <a:solidFill>
+              <a:schemeClr val="tx1"/>
+            </a:solidFill>
+            <a:prstDash val="solid"/>
             <a:miter lim="800000"/>
-            <a:headEnd/>
-            <a:tailEnd/>
           </a:ln>
-          <a:effectLst/>
-        </p:spPr>
-        <p:txBody>
-          <a:bodyPr wrap="none">
-            <a:spAutoFit/>
-          </a:bodyPr>
-          <a:lstStyle/>
-          <a:p>
-            <a:r>
-              <a:rPr lang="en-US" sz="2400" dirty="0" smtClean="0">
-                <a:solidFill>
-                  <a:schemeClr val="accent4">
-                    <a:lumMod val="60000"/>
-                    <a:lumOff val="40000"/>
-                  </a:schemeClr>
-                </a:solidFill>
-              </a:rPr>
-              <a:t>1.  Makes code more readable</a:t>
-            </a:r>
-            <a:endParaRPr lang="en-US" sz="2400" dirty="0">
-              <a:solidFill>
-                <a:schemeClr val="accent4">
-                  <a:lumMod val="60000"/>
-                  <a:lumOff val="40000"/>
-                </a:schemeClr>
-              </a:solidFill>
-            </a:endParaRPr>
-          </a:p>
-        </p:txBody>
-      </p:sp>
-      <p:sp>
-        <p:nvSpPr>
-          <p:cNvPr id="10" name="Text Box 17"/>
-          <p:cNvSpPr txBox="1">
-            <a:spLocks noChangeArrowheads="1"/>
-          </p:cNvSpPr>
-          <p:nvPr/>
-        </p:nvSpPr>
-        <p:spPr bwMode="auto">
-          <a:xfrm>
-            <a:off x="1225550" y="3033713"/>
-            <a:ext cx="6072496" cy="830997"/>
-          </a:xfrm>
-          <a:prstGeom prst="rect">
-            <a:avLst/>
-          </a:prstGeom>
-          <a:noFill/>
-          <a:ln w="9525">
-            <a:noFill/>
-            <a:miter lim="800000"/>
-            <a:headEnd/>
-            <a:tailEnd/>
-          </a:ln>
-          <a:effectLst/>
-        </p:spPr>
-        <p:txBody>
-          <a:bodyPr wrap="none">
-            <a:spAutoFit/>
-          </a:bodyPr>
-          <a:lstStyle/>
-          <a:p>
-            <a:r>
-              <a:rPr lang="en-US" sz="2400" dirty="0" smtClean="0">
-                <a:solidFill>
-                  <a:schemeClr val="accent4">
-                    <a:lumMod val="60000"/>
-                    <a:lumOff val="40000"/>
-                  </a:schemeClr>
-                </a:solidFill>
-              </a:rPr>
-              <a:t>2.  </a:t>
-            </a:r>
-            <a:r>
-              <a:rPr lang="en-US" sz="2400" dirty="0" smtClean="0">
-                <a:solidFill>
-                  <a:schemeClr val="accent4">
-                    <a:lumMod val="60000"/>
-                    <a:lumOff val="40000"/>
-                  </a:schemeClr>
-                </a:solidFill>
-              </a:rPr>
-              <a:t>Supports </a:t>
-            </a:r>
-            <a:r>
-              <a:rPr lang="en-US" sz="2400" dirty="0" smtClean="0">
-                <a:solidFill>
-                  <a:schemeClr val="accent4">
-                    <a:lumMod val="60000"/>
-                    <a:lumOff val="40000"/>
-                  </a:schemeClr>
-                </a:solidFill>
-              </a:rPr>
-              <a:t>Don’t Repeat Yourself (DRY)</a:t>
-            </a:r>
-          </a:p>
-          <a:p>
-            <a:endParaRPr lang="en-US" sz="2400" dirty="0">
-              <a:solidFill>
-                <a:schemeClr val="accent4">
-                  <a:lumMod val="60000"/>
-                  <a:lumOff val="40000"/>
-                </a:schemeClr>
-              </a:solidFill>
-            </a:endParaRPr>
-          </a:p>
-        </p:txBody>
-      </p:sp>
-      <p:sp>
-        <p:nvSpPr>
-          <p:cNvPr id="11" name="Rectangle 6"/>
+          <a:effectLst>
+            <a:innerShdw blurRad="50800" dist="50800" dir="13500000">
+              <a:srgbClr val="000000">
+                <a:alpha val="60000"/>
+              </a:srgbClr>
+            </a:innerShdw>
+          </a:effectLst>
+        </p:spPr>
+      </p:pic>
+      <p:sp>
+        <p:nvSpPr>
+          <p:cNvPr id="11" name="W¥ل云玗İαЂÕØÚáÛ丫:Téxt Plàçèhòlðêr 表¥鷗字㌍_W 10"/>
+          <p:cNvSpPr>
+            <a:spLocks noGrp="1"/>
+          </p:cNvSpPr>
+          <p:nvPr>
+            <p:ph type="body" sz="quarter" idx="13"/>
+          </p:nvPr>
+        </p:nvSpPr>
+        <p:spPr>
+          <a:xfrm>
+            <a:off x="4876800" y="1447800"/>
+            <a:ext cx="3962400" cy="5410200"/>
+          </a:xfrm>
+        </p:spPr>
+        <p:txBody>
+          <a:bodyPr/>
+          <a:lstStyle>
+            <a:extLst/>
+          </a:lstStyle>
+          <a:p>
+            <a:endParaRPr lang="en-US" dirty="0" smtClean="0"/>
+          </a:p>
+          <a:p>
+            <a:endParaRPr lang="en-US" dirty="0" smtClean="0"/>
+          </a:p>
+          <a:p>
+            <a:r>
+              <a:rPr lang="en-US" sz="2400" dirty="0" smtClean="0"/>
+              <a:t>Prefer active patterns over multiple ‘when guards’ during pattern matching.</a:t>
+            </a:r>
+          </a:p>
+          <a:p>
+            <a:endParaRPr lang="en-US" dirty="0" smtClean="0"/>
+          </a:p>
+          <a:p>
+            <a:endParaRPr lang="en-US" dirty="0" smtClean="0"/>
+          </a:p>
+          <a:p>
+            <a:endParaRPr lang="en-US" dirty="0" smtClean="0"/>
+          </a:p>
+        </p:txBody>
+      </p:sp>
+      <p:sp>
+        <p:nvSpPr>
+          <p:cNvPr id="6" name="Rectangle 6"/>
           <p:cNvSpPr txBox="1">
             <a:spLocks noChangeArrowheads="1"/>
           </p:cNvSpPr>
@@ -11245,10 +11165,7 @@
               <a:defRPr/>
             </a:pPr>
             <a:r>
-              <a:rPr kumimoji="0" lang="en-US" sz="4000" b="0" i="0" u="none" strike="noStrike" kern="0" cap="all" spc="0" normalizeH="0" baseline="0" noProof="0" dirty="0" smtClean="0">
-                <a:ln>
-                  <a:noFill/>
-                </a:ln>
+              <a:rPr lang="en-US" sz="4000" kern="0" cap="all" dirty="0" smtClean="0">
                 <a:solidFill>
                   <a:schemeClr val="tx2"/>
                 </a:solidFill>
@@ -11259,13 +11176,11 @@
                     </a:srgbClr>
                   </a:outerShdw>
                 </a:effectLst>
-                <a:uLnTx/>
-                <a:uFillTx/>
                 <a:latin typeface="+mj-lt"/>
                 <a:ea typeface="+mj-ea"/>
                 <a:cs typeface="+mj-cs"/>
               </a:rPr>
-              <a:t>Why is it good?</a:t>
+              <a:t>Active patterns</a:t>
             </a:r>
             <a:endParaRPr kumimoji="0" lang="en-US" sz="4000" b="0" i="0" u="none" strike="noStrike" kern="0" cap="all" spc="0" normalizeH="0" baseline="0" noProof="0" dirty="0">
               <a:ln>
@@ -11355,7 +11270,7 @@
         <p:spPr bwMode="auto">
           <a:xfrm>
             <a:off x="1235075" y="2438400"/>
-            <a:ext cx="6381875" cy="461665"/>
+            <a:ext cx="4376519" cy="461665"/>
           </a:xfrm>
           <a:prstGeom prst="rect">
             <a:avLst/>
@@ -11384,7 +11299,7 @@
                   </a:schemeClr>
                 </a:solidFill>
               </a:rPr>
-              <a:t>1.  Example of Active Patterns (XML parse)</a:t>
+              <a:t>1.  Makes code more readable</a:t>
             </a:r>
             <a:endParaRPr lang="en-US" sz="2400" dirty="0">
               <a:solidFill>
@@ -11408,7 +11323,7 @@
         <p:spPr bwMode="auto">
           <a:xfrm>
             <a:off x="1225550" y="3033713"/>
-            <a:ext cx="4974439" cy="830997"/>
+            <a:ext cx="6072496" cy="830997"/>
           </a:xfrm>
           <a:prstGeom prst="rect">
             <a:avLst/>
@@ -11437,7 +11352,7 @@
                   </a:schemeClr>
                 </a:solidFill>
               </a:rPr>
-              <a:t>2.  Node Join in Polyphony (DHT)</a:t>
+              <a:t>2.  Supports Don’t Repeat Yourself (DRY)</a:t>
             </a:r>
           </a:p>
           <a:p>
@@ -11511,7 +11426,7 @@
                 <a:ea typeface="+mj-ea"/>
                 <a:cs typeface="+mj-cs"/>
               </a:rPr>
-              <a:t>Examples</a:t>
+              <a:t>Why is it good?</a:t>
             </a:r>
             <a:endParaRPr kumimoji="0" lang="en-US" sz="4000" b="0" i="0" u="none" strike="noStrike" kern="0" cap="all" spc="0" normalizeH="0" baseline="0" noProof="0" dirty="0">
               <a:ln>
@@ -11573,100 +11488,134 @@
       </p:grpSpPr>
       <p:sp>
         <p:nvSpPr>
-          <p:cNvPr id="11" name="W¥ل云玗İαЂÕØÚáÛ丫:Téxt Plàçèhòlðêr 表¥鷗字㌍_W 10"/>
-          <p:cNvSpPr>
-            <a:spLocks noGrp="1"/>
-          </p:cNvSpPr>
-          <p:nvPr>
-            <p:ph type="body" sz="quarter" idx="13"/>
-          </p:nvPr>
-        </p:nvSpPr>
-        <p:spPr>
-          <a:xfrm>
-            <a:off x="4648200" y="1371600"/>
-            <a:ext cx="4191000" cy="5486400"/>
-          </a:xfrm>
-        </p:spPr>
+          <p:cNvPr id="3" name="Text Placeholder 2"/>
+          <p:cNvSpPr>
+            <a:spLocks noGrp="1"/>
+          </p:cNvSpPr>
+          <p:nvPr>
+            <p:ph type="body" sz="quarter" idx="11"/>
+          </p:nvPr>
+        </p:nvSpPr>
+        <p:spPr/>
         <p:txBody>
           <a:bodyPr/>
-          <a:lstStyle>
-            <a:extLst/>
-          </a:lstStyle>
-          <a:p>
-            <a:endParaRPr lang="en-US" sz="1800" dirty="0" smtClean="0"/>
-          </a:p>
-          <a:p>
-            <a:endParaRPr lang="en-US" dirty="0" smtClean="0"/>
-          </a:p>
-          <a:p>
-            <a:endParaRPr lang="en-US" sz="1800" dirty="0" smtClean="0"/>
-          </a:p>
-          <a:p>
-            <a:endParaRPr lang="en-US" sz="1800" dirty="0" smtClean="0"/>
-          </a:p>
-          <a:p>
-            <a:r>
-              <a:rPr lang="en-US" sz="2400" dirty="0" smtClean="0"/>
-              <a:t>Prefer pattern matching to if/else syntax.</a:t>
-            </a:r>
-          </a:p>
-          <a:p>
-            <a:endParaRPr lang="en-US" dirty="0" smtClean="0"/>
-          </a:p>
-          <a:p>
-            <a:endParaRPr lang="en-US" sz="1800" dirty="0" smtClean="0"/>
-          </a:p>
-          <a:p>
-            <a:endParaRPr lang="en-US" dirty="0" smtClean="0"/>
-          </a:p>
-        </p:txBody>
-      </p:sp>
-      <p:pic>
-        <p:nvPicPr>
-          <p:cNvPr id="13" name="trees_j0202227.png"/>
-          <p:cNvPicPr>
-            <a:picLocks noGrp="1" noChangeAspect="1"/>
-          </p:cNvPicPr>
-          <p:nvPr>
-            <p:ph type="pic" sz="quarter" idx="11"/>
-          </p:nvPr>
-        </p:nvPicPr>
-        <p:blipFill>
-          <a:blip r:embed="rId3" cstate="print"/>
-          <a:srcRect/>
-          <a:stretch>
-            <a:fillRect/>
-          </a:stretch>
-        </p:blipFill>
-        <p:spPr>
-          <a:xfrm>
-            <a:off x="457200" y="1219200"/>
-            <a:ext cx="4038600" cy="5384800"/>
-          </a:xfrm>
-          <a:prstGeom prst="roundRect">
-            <a:avLst>
-              <a:gd name="adj" fmla="val 16667"/>
-            </a:avLst>
+          <a:lstStyle/>
+          <a:p>
+            <a:endParaRPr lang="en-US"/>
+          </a:p>
+        </p:txBody>
+      </p:sp>
+      <p:sp>
+        <p:nvSpPr>
+          <p:cNvPr id="9" name="Text Box 16"/>
+          <p:cNvSpPr txBox="1">
+            <a:spLocks noChangeArrowheads="1"/>
+          </p:cNvSpPr>
+          <p:nvPr/>
+        </p:nvSpPr>
+        <p:spPr bwMode="auto">
+          <a:xfrm>
+            <a:off x="1235075" y="2438400"/>
+            <a:ext cx="6381875" cy="461665"/>
+          </a:xfrm>
+          <a:prstGeom prst="rect">
+            <a:avLst/>
           </a:prstGeom>
           <a:noFill/>
-          <a:ln w="38100" cap="sq" cmpd="sng" algn="ctr">
+          <a:ln w="9525">
             <a:noFill/>
-            <a:prstDash val="solid"/>
             <a:miter lim="800000"/>
+            <a:headEnd/>
+            <a:tailEnd/>
           </a:ln>
-          <a:effectLst>
-            <a:outerShdw blurRad="63500" dist="76200" dir="2700000" algn="tl" rotWithShape="0">
-              <a:srgbClr val="000000">
-                <a:alpha val="70000"/>
-              </a:srgbClr>
-            </a:outerShdw>
-            <a:softEdge rad="31750"/>
-          </a:effectLst>
-        </p:spPr>
-      </p:pic>
-      <p:sp>
-        <p:nvSpPr>
-          <p:cNvPr id="6" name="Rectangle 6"/>
+          <a:effectLst/>
+        </p:spPr>
+        <p:txBody>
+          <a:bodyPr wrap="none">
+            <a:spAutoFit/>
+          </a:bodyPr>
+          <a:lstStyle/>
+          <a:p>
+            <a:r>
+              <a:rPr lang="en-US" sz="2400" dirty="0" smtClean="0">
+                <a:solidFill>
+                  <a:schemeClr val="accent4">
+                    <a:lumMod val="60000"/>
+                    <a:lumOff val="40000"/>
+                  </a:schemeClr>
+                </a:solidFill>
+              </a:rPr>
+              <a:t>1.  Example of Active Patterns (XML parse)</a:t>
+            </a:r>
+            <a:endParaRPr lang="en-US" sz="2400" dirty="0">
+              <a:solidFill>
+                <a:schemeClr val="accent4">
+                  <a:lumMod val="60000"/>
+                  <a:lumOff val="40000"/>
+                </a:schemeClr>
+              </a:solidFill>
+            </a:endParaRPr>
+          </a:p>
+        </p:txBody>
+      </p:sp>
+      <p:sp>
+        <p:nvSpPr>
+          <p:cNvPr id="10" name="Text Box 17"/>
+          <p:cNvSpPr txBox="1">
+            <a:spLocks noChangeArrowheads="1"/>
+          </p:cNvSpPr>
+          <p:nvPr/>
+        </p:nvSpPr>
+        <p:spPr bwMode="auto">
+          <a:xfrm>
+            <a:off x="1225550" y="3033713"/>
+            <a:ext cx="4974439" cy="830997"/>
+          </a:xfrm>
+          <a:prstGeom prst="rect">
+            <a:avLst/>
+          </a:prstGeom>
+          <a:noFill/>
+          <a:ln w="9525">
+            <a:noFill/>
+            <a:miter lim="800000"/>
+            <a:headEnd/>
+            <a:tailEnd/>
+          </a:ln>
+          <a:effectLst/>
+        </p:spPr>
+        <p:txBody>
+          <a:bodyPr wrap="none">
+            <a:spAutoFit/>
+          </a:bodyPr>
+          <a:lstStyle/>
+          <a:p>
+            <a:r>
+              <a:rPr lang="en-US" sz="2400" dirty="0" smtClean="0">
+                <a:solidFill>
+                  <a:schemeClr val="accent4">
+                    <a:lumMod val="60000"/>
+                    <a:lumOff val="40000"/>
+                  </a:schemeClr>
+                </a:solidFill>
+              </a:rPr>
+              <a:t>2.  Node Join in Polyphony (DHT)</a:t>
+            </a:r>
+          </a:p>
+          <a:p>
+            <a:endParaRPr lang="en-US" sz="2400" dirty="0">
+              <a:solidFill>
+                <a:schemeClr val="accent4">
+                  <a:lumMod val="60000"/>
+                  <a:lumOff val="40000"/>
+                </a:schemeClr>
+              </a:solidFill>
+            </a:endParaRPr>
+          </a:p>
+        </p:txBody>
+      </p:sp>
+      <p:sp>
+        <p:nvSpPr>
+          <p:cNvPr id="11" name="Rectangle 6"/>
           <p:cNvSpPr txBox="1">
             <a:spLocks noChangeArrowheads="1"/>
           </p:cNvSpPr>
@@ -11723,53 +11672,7 @@
                 <a:ea typeface="+mj-ea"/>
                 <a:cs typeface="+mj-cs"/>
               </a:rPr>
-              <a:t>Pattern</a:t>
-            </a:r>
-            <a:r>
-              <a:rPr kumimoji="0" lang="en-US" sz="4000" b="0" i="0" u="none" strike="noStrike" kern="0" cap="all" spc="0" normalizeH="0" noProof="0" dirty="0" smtClean="0">
-                <a:ln>
-                  <a:noFill/>
-                </a:ln>
-                <a:solidFill>
-                  <a:schemeClr val="tx2"/>
-                </a:solidFill>
-                <a:effectLst>
-                  <a:outerShdw blurRad="51000" dist="37000" dir="5400000" algn="tl" rotWithShape="0">
-                    <a:srgbClr val="000000">
-                      <a:alpha val="25000"/>
-                    </a:srgbClr>
-                  </a:outerShdw>
-                </a:effectLst>
-                <a:uLnTx/>
-                <a:uFillTx/>
-                <a:latin typeface="+mj-lt"/>
-                <a:ea typeface="+mj-ea"/>
-                <a:cs typeface="+mj-cs"/>
-              </a:rPr>
-              <a:t> </a:t>
-            </a:r>
-            <a:r>
-              <a:rPr kumimoji="0" lang="en-US" sz="4000" b="0" i="0" u="none" strike="noStrike" kern="0" cap="all" spc="0" normalizeH="0" noProof="0" dirty="0" smtClean="0">
-                <a:ln>
-                  <a:noFill/>
-                </a:ln>
-                <a:solidFill>
-                  <a:schemeClr val="tx2"/>
-                </a:solidFill>
-                <a:effectLst>
-                  <a:outerShdw blurRad="51000" dist="37000" dir="5400000" algn="tl" rotWithShape="0">
-                    <a:srgbClr val="000000">
-                      <a:alpha val="25000"/>
-                    </a:srgbClr>
-                  </a:outerShdw>
-                </a:effectLst>
-                <a:uLnTx/>
-                <a:uFillTx/>
-                <a:latin typeface="+mj-lt"/>
-                <a:ea typeface="+mj-ea"/>
-                <a:cs typeface="+mj-cs"/>
-              </a:rPr>
-              <a:t>Matching</a:t>
+              <a:t>Examples</a:t>
             </a:r>
             <a:endParaRPr kumimoji="0" lang="en-US" sz="4000" b="0" i="0" u="none" strike="noStrike" kern="0" cap="all" spc="0" normalizeH="0" baseline="0" noProof="0" dirty="0">
               <a:ln>
@@ -11831,79 +11734,100 @@
       </p:grpSpPr>
       <p:sp>
         <p:nvSpPr>
-          <p:cNvPr id="3" name="Text Placeholder 2"/>
-          <p:cNvSpPr>
-            <a:spLocks noGrp="1"/>
-          </p:cNvSpPr>
-          <p:nvPr>
-            <p:ph type="body" sz="quarter" idx="11"/>
-          </p:nvPr>
-        </p:nvSpPr>
-        <p:spPr/>
+          <p:cNvPr id="11" name="W¥ل云玗İαЂÕØÚáÛ丫:Téxt Plàçèhòlðêr 表¥鷗字㌍_W 10"/>
+          <p:cNvSpPr>
+            <a:spLocks noGrp="1"/>
+          </p:cNvSpPr>
+          <p:nvPr>
+            <p:ph type="body" sz="quarter" idx="13"/>
+          </p:nvPr>
+        </p:nvSpPr>
+        <p:spPr>
+          <a:xfrm>
+            <a:off x="4648200" y="1371600"/>
+            <a:ext cx="4191000" cy="5486400"/>
+          </a:xfrm>
+        </p:spPr>
         <p:txBody>
           <a:bodyPr/>
-          <a:lstStyle/>
-          <a:p>
-            <a:endParaRPr lang="en-US"/>
-          </a:p>
-        </p:txBody>
-      </p:sp>
-      <p:sp>
-        <p:nvSpPr>
-          <p:cNvPr id="9" name="Text Box 16"/>
-          <p:cNvSpPr txBox="1">
-            <a:spLocks noChangeArrowheads="1"/>
-          </p:cNvSpPr>
-          <p:nvPr/>
-        </p:nvSpPr>
-        <p:spPr bwMode="auto">
-          <a:xfrm>
-            <a:off x="1235075" y="2438400"/>
-            <a:ext cx="5325497" cy="461665"/>
-          </a:xfrm>
-          <a:prstGeom prst="rect">
-            <a:avLst/>
+          <a:lstStyle>
+            <a:extLst/>
+          </a:lstStyle>
+          <a:p>
+            <a:endParaRPr lang="en-US" sz="1800" dirty="0" smtClean="0"/>
+          </a:p>
+          <a:p>
+            <a:endParaRPr lang="en-US" dirty="0" smtClean="0"/>
+          </a:p>
+          <a:p>
+            <a:endParaRPr lang="en-US" sz="1800" dirty="0" smtClean="0"/>
+          </a:p>
+          <a:p>
+            <a:endParaRPr lang="en-US" sz="1800" dirty="0" smtClean="0"/>
+          </a:p>
+          <a:p>
+            <a:r>
+              <a:rPr lang="en-US" sz="2400" dirty="0" smtClean="0"/>
+              <a:t>Prefer pattern matching to if/else syntax.</a:t>
+            </a:r>
+          </a:p>
+          <a:p>
+            <a:endParaRPr lang="en-US" dirty="0" smtClean="0"/>
+          </a:p>
+          <a:p>
+            <a:endParaRPr lang="en-US" sz="1800" dirty="0" smtClean="0"/>
+          </a:p>
+          <a:p>
+            <a:endParaRPr lang="en-US" dirty="0" smtClean="0"/>
+          </a:p>
+        </p:txBody>
+      </p:sp>
+      <p:pic>
+        <p:nvPicPr>
+          <p:cNvPr id="13" name="trees_j0202227.png"/>
+          <p:cNvPicPr>
+            <a:picLocks noGrp="1" noChangeAspect="1"/>
+          </p:cNvPicPr>
+          <p:nvPr>
+            <p:ph type="pic" sz="quarter" idx="11"/>
+          </p:nvPr>
+        </p:nvPicPr>
+        <p:blipFill>
+          <a:blip r:embed="rId3" cstate="print"/>
+          <a:srcRect/>
+          <a:stretch>
+            <a:fillRect/>
+          </a:stretch>
+        </p:blipFill>
+        <p:spPr>
+          <a:xfrm>
+            <a:off x="457200" y="1219200"/>
+            <a:ext cx="4038600" cy="5384800"/>
+          </a:xfrm>
+          <a:prstGeom prst="roundRect">
+            <a:avLst>
+              <a:gd name="adj" fmla="val 16667"/>
+            </a:avLst>
           </a:prstGeom>
           <a:noFill/>
-          <a:ln w="9525">
+          <a:ln w="38100" cap="sq" cmpd="sng" algn="ctr">
             <a:noFill/>
+            <a:prstDash val="solid"/>
             <a:miter lim="800000"/>
-            <a:headEnd/>
-            <a:tailEnd/>
           </a:ln>
-          <a:effectLst/>
-        </p:spPr>
-        <p:txBody>
-          <a:bodyPr wrap="none">
-            <a:spAutoFit/>
-          </a:bodyPr>
-          <a:lstStyle/>
-          <a:p>
-            <a:r>
-              <a:rPr lang="en-US" sz="2400" dirty="0" smtClean="0">
-                <a:solidFill>
-                  <a:schemeClr val="accent4">
-                    <a:lumMod val="60000"/>
-                    <a:lumOff val="40000"/>
-                  </a:schemeClr>
-                </a:solidFill>
-              </a:rPr>
-              <a:t>1.  Makes your code easier to extend</a:t>
-            </a:r>
-            <a:endParaRPr lang="en-US" sz="2400" dirty="0">
-              <a:solidFill>
-                <a:schemeClr val="accent4">
-                  <a:lumMod val="60000"/>
-                  <a:lumOff val="40000"/>
-                </a:schemeClr>
-              </a:solidFill>
-            </a:endParaRPr>
-          </a:p>
-        </p:txBody>
-      </p:sp>
-      <p:sp>
-        <p:nvSpPr>
-          <p:cNvPr id="11" name="Rectangle 6"/>
+          <a:effectLst>
+            <a:outerShdw blurRad="63500" dist="76200" dir="2700000" algn="tl" rotWithShape="0">
+              <a:srgbClr val="000000">
+                <a:alpha val="70000"/>
+              </a:srgbClr>
+            </a:outerShdw>
+            <a:softEdge rad="31750"/>
+          </a:effectLst>
+        </p:spPr>
+      </p:pic>
+      <p:sp>
+        <p:nvSpPr>
+          <p:cNvPr id="6" name="Rectangle 6"/>
           <p:cNvSpPr txBox="1">
             <a:spLocks noChangeArrowheads="1"/>
           </p:cNvSpPr>
@@ -11960,7 +11884,7 @@
                 <a:ea typeface="+mj-ea"/>
                 <a:cs typeface="+mj-cs"/>
               </a:rPr>
-              <a:t>Why</a:t>
+              <a:t>Pattern</a:t>
             </a:r>
             <a:r>
               <a:rPr kumimoji="0" lang="en-US" sz="4000" b="0" i="0" u="none" strike="noStrike" kern="0" cap="all" spc="0" normalizeH="0" noProof="0" dirty="0" smtClean="0">
@@ -11983,7 +11907,7 @@
                 <a:ea typeface="+mj-ea"/>
                 <a:cs typeface="+mj-cs"/>
               </a:rPr>
-              <a:t> is it good?</a:t>
+              <a:t> Matching</a:t>
             </a:r>
             <a:endParaRPr kumimoji="0" lang="en-US" sz="4000" b="0" i="0" u="none" strike="noStrike" kern="0" cap="all" spc="0" normalizeH="0" baseline="0" noProof="0" dirty="0">
               <a:ln>
@@ -12004,59 +11928,6 @@
               <a:latin typeface="+mj-lt"/>
               <a:ea typeface="+mj-ea"/>
               <a:cs typeface="+mj-cs"/>
-            </a:endParaRPr>
-          </a:p>
-        </p:txBody>
-      </p:sp>
-      <p:sp>
-        <p:nvSpPr>
-          <p:cNvPr id="5" name="Text Box 16"/>
-          <p:cNvSpPr txBox="1">
-            <a:spLocks noChangeArrowheads="1"/>
-          </p:cNvSpPr>
-          <p:nvPr/>
-        </p:nvSpPr>
-        <p:spPr bwMode="auto">
-          <a:xfrm>
-            <a:off x="1219200" y="3043535"/>
-            <a:ext cx="6832320" cy="461665"/>
-          </a:xfrm>
-          <a:prstGeom prst="rect">
-            <a:avLst/>
-          </a:prstGeom>
-          <a:noFill/>
-          <a:ln w="9525">
-            <a:noFill/>
-            <a:miter lim="800000"/>
-            <a:headEnd/>
-            <a:tailEnd/>
-          </a:ln>
-          <a:effectLst/>
-        </p:spPr>
-        <p:txBody>
-          <a:bodyPr wrap="none">
-            <a:spAutoFit/>
-          </a:bodyPr>
-          <a:lstStyle/>
-          <a:p>
-            <a:r>
-              <a:rPr lang="en-US" sz="2400" dirty="0" smtClean="0">
-                <a:solidFill>
-                  <a:schemeClr val="accent4">
-                    <a:lumMod val="60000"/>
-                    <a:lumOff val="40000"/>
-                  </a:schemeClr>
-                </a:solidFill>
-              </a:rPr>
-              <a:t>2.  Helps get you out of the procedural mindset</a:t>
-            </a:r>
-            <a:endParaRPr lang="en-US" sz="2400" dirty="0">
-              <a:solidFill>
-                <a:schemeClr val="accent4">
-                  <a:lumMod val="60000"/>
-                  <a:lumOff val="40000"/>
-                </a:schemeClr>
-              </a:solidFill>
             </a:endParaRPr>
           </a:p>
         </p:txBody>
@@ -12126,7 +11997,7 @@
         <p:spPr bwMode="auto">
           <a:xfrm>
             <a:off x="1235075" y="2438400"/>
-            <a:ext cx="5937844" cy="461665"/>
+            <a:ext cx="5325497" cy="461665"/>
           </a:xfrm>
           <a:prstGeom prst="rect">
             <a:avLst/>
@@ -12155,7 +12026,7 @@
                   </a:schemeClr>
                 </a:solidFill>
               </a:rPr>
-              <a:t>1.  MVC Template Authentication Type</a:t>
+              <a:t>1.  Makes your code easier to extend</a:t>
             </a:r>
             <a:endParaRPr lang="en-US" sz="2400" dirty="0">
               <a:solidFill>
@@ -12227,7 +12098,30 @@
                 <a:ea typeface="+mj-ea"/>
                 <a:cs typeface="+mj-cs"/>
               </a:rPr>
-              <a:t>Examples</a:t>
+              <a:t>Why</a:t>
+            </a:r>
+            <a:r>
+              <a:rPr kumimoji="0" lang="en-US" sz="4000" b="0" i="0" u="none" strike="noStrike" kern="0" cap="all" spc="0" normalizeH="0" noProof="0" dirty="0" smtClean="0">
+                <a:ln>
+                  <a:noFill/>
+                </a:ln>
+                <a:solidFill>
+                  <a:schemeClr val="tx2"/>
+                </a:solidFill>
+                <a:effectLst>
+                  <a:outerShdw blurRad="51000" dist="37000" dir="5400000" algn="tl" rotWithShape="0">
+                    <a:srgbClr val="000000">
+                      <a:alpha val="25000"/>
+                    </a:srgbClr>
+                  </a:outerShdw>
+                </a:effectLst>
+                <a:uLnTx/>
+                <a:uFillTx/>
+                <a:latin typeface="+mj-lt"/>
+                <a:ea typeface="+mj-ea"/>
+                <a:cs typeface="+mj-cs"/>
+              </a:rPr>
+              <a:t> is it good?</a:t>
             </a:r>
             <a:endParaRPr kumimoji="0" lang="en-US" sz="4000" b="0" i="0" u="none" strike="noStrike" kern="0" cap="all" spc="0" normalizeH="0" baseline="0" noProof="0" dirty="0">
               <a:ln>
@@ -12248,6 +12142,59 @@
               <a:latin typeface="+mj-lt"/>
               <a:ea typeface="+mj-ea"/>
               <a:cs typeface="+mj-cs"/>
+            </a:endParaRPr>
+          </a:p>
+        </p:txBody>
+      </p:sp>
+      <p:sp>
+        <p:nvSpPr>
+          <p:cNvPr id="5" name="Text Box 16"/>
+          <p:cNvSpPr txBox="1">
+            <a:spLocks noChangeArrowheads="1"/>
+          </p:cNvSpPr>
+          <p:nvPr/>
+        </p:nvSpPr>
+        <p:spPr bwMode="auto">
+          <a:xfrm>
+            <a:off x="1219200" y="3043535"/>
+            <a:ext cx="6832320" cy="461665"/>
+          </a:xfrm>
+          <a:prstGeom prst="rect">
+            <a:avLst/>
+          </a:prstGeom>
+          <a:noFill/>
+          <a:ln w="9525">
+            <a:noFill/>
+            <a:miter lim="800000"/>
+            <a:headEnd/>
+            <a:tailEnd/>
+          </a:ln>
+          <a:effectLst/>
+        </p:spPr>
+        <p:txBody>
+          <a:bodyPr wrap="none">
+            <a:spAutoFit/>
+          </a:bodyPr>
+          <a:lstStyle/>
+          <a:p>
+            <a:r>
+              <a:rPr lang="en-US" sz="2400" dirty="0" smtClean="0">
+                <a:solidFill>
+                  <a:schemeClr val="accent4">
+                    <a:lumMod val="60000"/>
+                    <a:lumOff val="40000"/>
+                  </a:schemeClr>
+                </a:solidFill>
+              </a:rPr>
+              <a:t>2.  Helps get you out of the procedural mindset</a:t>
+            </a:r>
+            <a:endParaRPr lang="en-US" sz="2400" dirty="0">
+              <a:solidFill>
+                <a:schemeClr val="accent4">
+                  <a:lumMod val="60000"/>
+                  <a:lumOff val="40000"/>
+                </a:schemeClr>
+              </a:solidFill>
             </a:endParaRPr>
           </a:p>
         </p:txBody>
@@ -12769,6 +12716,197 @@
 </file>
 
 <file path=ppt/slides/slide20.xml><?xml version="1.0" encoding="utf-8"?>
+<p:sld xmlns:a="http://schemas.openxmlformats.org/drawingml/2006/main" xmlns:r="http://schemas.openxmlformats.org/officeDocument/2006/relationships" xmlns:p="http://schemas.openxmlformats.org/presentationml/2006/main">
+  <p:cSld>
+    <p:spTree>
+      <p:nvGrpSpPr>
+        <p:cNvPr id="1" name=""/>
+        <p:cNvGrpSpPr/>
+        <p:nvPr/>
+      </p:nvGrpSpPr>
+      <p:grpSpPr>
+        <a:xfrm>
+          <a:off x="0" y="0"/>
+          <a:ext cx="0" cy="0"/>
+          <a:chOff x="0" y="0"/>
+          <a:chExt cx="0" cy="0"/>
+        </a:xfrm>
+      </p:grpSpPr>
+      <p:sp>
+        <p:nvSpPr>
+          <p:cNvPr id="3" name="Text Placeholder 2"/>
+          <p:cNvSpPr>
+            <a:spLocks noGrp="1"/>
+          </p:cNvSpPr>
+          <p:nvPr>
+            <p:ph type="body" sz="quarter" idx="11"/>
+          </p:nvPr>
+        </p:nvSpPr>
+        <p:spPr/>
+        <p:txBody>
+          <a:bodyPr/>
+          <a:lstStyle/>
+          <a:p>
+            <a:endParaRPr lang="en-US"/>
+          </a:p>
+        </p:txBody>
+      </p:sp>
+      <p:sp>
+        <p:nvSpPr>
+          <p:cNvPr id="9" name="Text Box 16"/>
+          <p:cNvSpPr txBox="1">
+            <a:spLocks noChangeArrowheads="1"/>
+          </p:cNvSpPr>
+          <p:nvPr/>
+        </p:nvSpPr>
+        <p:spPr bwMode="auto">
+          <a:xfrm>
+            <a:off x="1235075" y="2438400"/>
+            <a:ext cx="5937844" cy="461665"/>
+          </a:xfrm>
+          <a:prstGeom prst="rect">
+            <a:avLst/>
+          </a:prstGeom>
+          <a:noFill/>
+          <a:ln w="9525">
+            <a:noFill/>
+            <a:miter lim="800000"/>
+            <a:headEnd/>
+            <a:tailEnd/>
+          </a:ln>
+          <a:effectLst/>
+        </p:spPr>
+        <p:txBody>
+          <a:bodyPr wrap="none">
+            <a:spAutoFit/>
+          </a:bodyPr>
+          <a:lstStyle/>
+          <a:p>
+            <a:r>
+              <a:rPr lang="en-US" sz="2400" dirty="0" smtClean="0">
+                <a:solidFill>
+                  <a:schemeClr val="accent4">
+                    <a:lumMod val="60000"/>
+                    <a:lumOff val="40000"/>
+                  </a:schemeClr>
+                </a:solidFill>
+              </a:rPr>
+              <a:t>1.  MVC Template Authentication Type</a:t>
+            </a:r>
+            <a:endParaRPr lang="en-US" sz="2400" dirty="0">
+              <a:solidFill>
+                <a:schemeClr val="accent4">
+                  <a:lumMod val="60000"/>
+                  <a:lumOff val="40000"/>
+                </a:schemeClr>
+              </a:solidFill>
+            </a:endParaRPr>
+          </a:p>
+        </p:txBody>
+      </p:sp>
+      <p:sp>
+        <p:nvSpPr>
+          <p:cNvPr id="11" name="Rectangle 6"/>
+          <p:cNvSpPr txBox="1">
+            <a:spLocks noChangeArrowheads="1"/>
+          </p:cNvSpPr>
+          <p:nvPr/>
+        </p:nvSpPr>
+        <p:spPr>
+          <a:xfrm>
+            <a:off x="304800" y="304800"/>
+            <a:ext cx="8839200" cy="838200"/>
+          </a:xfrm>
+          <a:prstGeom prst="rect">
+            <a:avLst/>
+          </a:prstGeom>
+        </p:spPr>
+        <p:txBody>
+          <a:bodyPr/>
+          <a:lstStyle/>
+          <a:p>
+            <a:pPr marL="0" marR="0" lvl="0" indent="0" algn="l" defTabSz="914400" rtl="0" eaLnBrk="1" fontAlgn="auto" latinLnBrk="0" hangingPunct="1">
+              <a:lnSpc>
+                <a:spcPct val="100000"/>
+              </a:lnSpc>
+              <a:spcBef>
+                <a:spcPct val="0"/>
+              </a:spcBef>
+              <a:spcAft>
+                <a:spcPts val="0"/>
+              </a:spcAft>
+              <a:buClrTx/>
+              <a:buSzTx/>
+              <a:buFontTx/>
+              <a:buNone/>
+              <a:tabLst/>
+              <a:defRPr/>
+            </a:pPr>
+            <a:r>
+              <a:rPr kumimoji="0" lang="en-US" sz="4000" b="0" i="0" u="none" strike="noStrike" kern="0" cap="all" spc="0" normalizeH="0" baseline="0" noProof="0" dirty="0" smtClean="0">
+                <a:ln>
+                  <a:noFill/>
+                </a:ln>
+                <a:solidFill>
+                  <a:schemeClr val="tx2"/>
+                </a:solidFill>
+                <a:effectLst>
+                  <a:outerShdw blurRad="51000" dist="37000" dir="5400000" algn="tl" rotWithShape="0">
+                    <a:srgbClr val="000000">
+                      <a:alpha val="25000"/>
+                    </a:srgbClr>
+                  </a:outerShdw>
+                </a:effectLst>
+                <a:uLnTx/>
+                <a:uFillTx/>
+                <a:latin typeface="+mj-lt"/>
+                <a:ea typeface="+mj-ea"/>
+                <a:cs typeface="+mj-cs"/>
+              </a:rPr>
+              <a:t>Examples</a:t>
+            </a:r>
+            <a:endParaRPr kumimoji="0" lang="en-US" sz="4000" b="0" i="0" u="none" strike="noStrike" kern="0" cap="all" spc="0" normalizeH="0" baseline="0" noProof="0" dirty="0">
+              <a:ln>
+                <a:noFill/>
+              </a:ln>
+              <a:solidFill>
+                <a:schemeClr val="tx2"/>
+              </a:solidFill>
+              <a:effectLst>
+                <a:outerShdw blurRad="51000" dist="37000" dir="5400000" algn="tl" rotWithShape="0">
+                  <a:srgbClr val="000000">
+                    <a:alpha val="25000"/>
+                  </a:srgbClr>
+                </a:outerShdw>
+              </a:effectLst>
+              <a:uLnTx/>
+              <a:uFillTx/>
+              <a:latin typeface="+mj-lt"/>
+              <a:ea typeface="+mj-ea"/>
+              <a:cs typeface="+mj-cs"/>
+            </a:endParaRPr>
+          </a:p>
+        </p:txBody>
+      </p:sp>
+    </p:spTree>
+  </p:cSld>
+  <p:clrMapOvr>
+    <a:masterClrMapping/>
+  </p:clrMapOvr>
+  <p:transition>
+    <p:fade/>
+  </p:transition>
+  <p:timing>
+    <p:tnLst>
+      <p:par>
+        <p:cTn id="1" dur="indefinite" restart="never" nodeType="tmRoot"/>
+      </p:par>
+    </p:tnLst>
+  </p:timing>
+</p:sld>
+</file>
+
+<file path=ppt/slides/slide21.xml><?xml version="1.0" encoding="utf-8"?>
 <p:sld xmlns:a="http://schemas.openxmlformats.org/drawingml/2006/main" xmlns:r="http://schemas.openxmlformats.org/officeDocument/2006/relationships" xmlns:p="http://schemas.openxmlformats.org/presentationml/2006/main">
   <p:cSld>
     <p:spTree>
@@ -13796,7 +13934,7 @@
         <p:spPr bwMode="auto">
           <a:xfrm>
             <a:off x="1235075" y="2438400"/>
-            <a:ext cx="7694735" cy="461665"/>
+            <a:ext cx="5489003" cy="461665"/>
           </a:xfrm>
           <a:prstGeom prst="rect">
             <a:avLst/>
@@ -13825,7 +13963,18 @@
                   </a:schemeClr>
                 </a:solidFill>
               </a:rPr>
-              <a:t>1.   Follows the Single Responsibility Principle (SRP)</a:t>
+              <a:t>1.  </a:t>
+            </a:r>
+            <a:r>
+              <a:rPr lang="en-US" sz="2400" dirty="0" smtClean="0">
+                <a:solidFill>
+                  <a:schemeClr val="accent4">
+                    <a:lumMod val="60000"/>
+                    <a:lumOff val="40000"/>
+                  </a:schemeClr>
+                </a:solidFill>
+              </a:rPr>
+              <a:t>Helps enable function composition</a:t>
             </a:r>
             <a:endParaRPr lang="en-US" sz="2400" dirty="0">
               <a:solidFill>
@@ -13849,7 +13998,7 @@
         <p:spPr bwMode="auto">
           <a:xfrm>
             <a:off x="1225550" y="3033713"/>
-            <a:ext cx="5716630" cy="461665"/>
+            <a:ext cx="7609776" cy="461665"/>
           </a:xfrm>
           <a:prstGeom prst="rect">
             <a:avLst/>
@@ -13878,7 +14027,40 @@
                   </a:schemeClr>
                 </a:solidFill>
               </a:rPr>
-              <a:t>2.   Helps enables function composition</a:t>
+              <a:t>2. </a:t>
+            </a:r>
+            <a:r>
+              <a:rPr lang="en-US" sz="2400" dirty="0" smtClean="0">
+                <a:solidFill>
+                  <a:schemeClr val="accent4">
+                    <a:lumMod val="60000"/>
+                    <a:lumOff val="40000"/>
+                  </a:schemeClr>
+                </a:solidFill>
+              </a:rPr>
+              <a:t> </a:t>
+            </a:r>
+            <a:r>
+              <a:rPr lang="en-US" sz="2400" dirty="0" smtClean="0">
+                <a:solidFill>
+                  <a:schemeClr val="accent4">
+                    <a:lumMod val="60000"/>
+                    <a:lumOff val="40000"/>
+                  </a:schemeClr>
+                </a:solidFill>
+              </a:rPr>
+              <a:t>Follows </a:t>
+            </a:r>
+            <a:r>
+              <a:rPr lang="en-US" sz="2400" dirty="0" smtClean="0">
+                <a:solidFill>
+                  <a:schemeClr val="accent4">
+                    <a:lumMod val="60000"/>
+                    <a:lumOff val="40000"/>
+                  </a:schemeClr>
+                </a:solidFill>
+              </a:rPr>
+              <a:t>the Single Responsibility Principle (SRP)</a:t>
             </a:r>
             <a:endParaRPr lang="en-US" sz="2400" dirty="0">
               <a:solidFill>

</xml_diff>

<commit_message>
A few changes to the examples
</commit_message>
<xml_diff>
--- a/5 Best Practices for F# Development.pptx
+++ b/5 Best Practices for F# Development.pptx
@@ -216,7 +216,7 @@
             <a:fld id="{68F88C59-319B-4332-9A1D-2A62CFCB00D8}" type="datetimeFigureOut">
               <a:rPr lang="en-US" smtClean="0"/>
               <a:pPr/>
-              <a:t>6/12/2010</a:t>
+              <a:t>6/27/2010</a:t>
             </a:fld>
             <a:endParaRPr lang="en-US"/>
           </a:p>
@@ -292,6 +292,11 @@
         </p:txBody>
       </p:sp>
     </p:spTree>
+    <p:extLst>
+      <p:ext uri="{BB962C8B-B14F-4D97-AF65-F5344CB8AC3E}">
+        <p14:creationId xmlns:p14="http://schemas.microsoft.com/office/powerpoint/2010/main" val="838176901"/>
+      </p:ext>
+    </p:extLst>
   </p:cSld>
   <p:clrMap bg1="lt1" tx1="dk1" bg2="lt2" tx2="dk2" accent1="accent1" accent2="accent2" accent3="accent3" accent4="accent4" accent5="accent5" accent6="accent6" hlink="hlink" folHlink="folHlink"/>
 </p:handoutMaster>
@@ -382,7 +387,7 @@
             <a:fld id="{968B300D-05F0-4B43-940D-46DED5A791AD}" type="datetimeFigureOut">
               <a:rPr lang="en-US" smtClean="0"/>
               <a:pPr/>
-              <a:t>6/12/2010</a:t>
+              <a:t>6/27/2010</a:t>
             </a:fld>
             <a:endParaRPr lang="en-US"/>
           </a:p>
@@ -558,6 +563,11 @@
         </p:txBody>
       </p:sp>
     </p:spTree>
+    <p:extLst>
+      <p:ext uri="{BB962C8B-B14F-4D97-AF65-F5344CB8AC3E}">
+        <p14:creationId xmlns:p14="http://schemas.microsoft.com/office/powerpoint/2010/main" val="1188492307"/>
+      </p:ext>
+    </p:extLst>
   </p:cSld>
   <p:clrMap bg1="lt1" tx1="dk1" bg2="lt2" tx2="dk2" accent1="accent1" accent2="accent2" accent3="accent3" accent4="accent4" accent5="accent5" accent6="accent6" hlink="hlink" folHlink="folHlink"/>
   <p:notesStyle>
@@ -1448,7 +1458,7 @@
                 </a:solidFill>
               </a:rPr>
               <a:pPr/>
-              <a:t>6/12/2010</a:t>
+              <a:t>6/27/2010</a:t>
             </a:fld>
             <a:endParaRPr lang="en-US"/>
           </a:p>
@@ -1876,7 +1886,7 @@
                 </a:solidFill>
               </a:rPr>
               <a:pPr/>
-              <a:t>6/12/2010</a:t>
+              <a:t>6/27/2010</a:t>
             </a:fld>
             <a:endParaRPr lang="en-US"/>
           </a:p>
@@ -2247,7 +2257,7 @@
                 </a:solidFill>
               </a:rPr>
               <a:pPr/>
-              <a:t>6/12/2010</a:t>
+              <a:t>6/27/2010</a:t>
             </a:fld>
             <a:endParaRPr lang="en-US"/>
           </a:p>
@@ -2852,7 +2862,7 @@
                 </a:solidFill>
               </a:rPr>
               <a:pPr/>
-              <a:t>6/12/2010</a:t>
+              <a:t>6/27/2010</a:t>
             </a:fld>
             <a:endParaRPr lang="en-US"/>
           </a:p>
@@ -3438,7 +3448,7 @@
                 </a:solidFill>
               </a:rPr>
               <a:pPr/>
-              <a:t>6/12/2010</a:t>
+              <a:t>6/27/2010</a:t>
             </a:fld>
             <a:endParaRPr lang="en-US"/>
           </a:p>
@@ -3916,7 +3926,7 @@
                 </a:solidFill>
               </a:rPr>
               <a:pPr/>
-              <a:t>6/12/2010</a:t>
+              <a:t>6/27/2010</a:t>
             </a:fld>
             <a:endParaRPr lang="en-US"/>
           </a:p>
@@ -4358,7 +4368,7 @@
                 </a:solidFill>
               </a:rPr>
               <a:pPr/>
-              <a:t>6/12/2010</a:t>
+              <a:t>6/27/2010</a:t>
             </a:fld>
             <a:endParaRPr lang="en-US"/>
           </a:p>
@@ -4883,7 +4893,7 @@
                 </a:solidFill>
               </a:rPr>
               <a:pPr/>
-              <a:t>6/12/2010</a:t>
+              <a:t>6/27/2010</a:t>
             </a:fld>
             <a:endParaRPr lang="en-US"/>
           </a:p>
@@ -5408,7 +5418,7 @@
                 </a:solidFill>
               </a:rPr>
               <a:pPr/>
-              <a:t>6/12/2010</a:t>
+              <a:t>6/27/2010</a:t>
             </a:fld>
             <a:endParaRPr lang="en-US"/>
           </a:p>
@@ -5637,7 +5647,7 @@
                 </a:solidFill>
               </a:rPr>
               <a:pPr/>
-              <a:t>6/12/2010</a:t>
+              <a:t>6/27/2010</a:t>
             </a:fld>
             <a:endParaRPr lang="en-US"/>
           </a:p>
@@ -5985,7 +5995,7 @@
                 </a:solidFill>
               </a:rPr>
               <a:pPr/>
-              <a:t>6/12/2010</a:t>
+              <a:t>6/27/2010</a:t>
             </a:fld>
             <a:endParaRPr lang="en-US"/>
           </a:p>
@@ -6231,7 +6241,7 @@
                 </a:solidFill>
               </a:rPr>
               <a:pPr/>
-              <a:t>6/12/2010</a:t>
+              <a:t>6/27/2010</a:t>
             </a:fld>
             <a:endParaRPr lang="en-US"/>
           </a:p>
@@ -6460,7 +6470,7 @@
                 </a:solidFill>
               </a:rPr>
               <a:pPr/>
-              <a:t>6/12/2010</a:t>
+              <a:t>6/27/2010</a:t>
             </a:fld>
             <a:endParaRPr lang="en-US"/>
           </a:p>
@@ -6645,7 +6655,7 @@
             <a:fld id="{ACB2EC6F-6501-4E04-BD6C-A8A6CABB2C5B}" type="datetimeFigureOut">
               <a:rPr lang="en-US" smtClean="0"/>
               <a:pPr/>
-              <a:t>6/12/2010</a:t>
+              <a:t>6/27/2010</a:t>
             </a:fld>
             <a:endParaRPr lang="en-US"/>
           </a:p>
@@ -6903,7 +6913,7 @@
                 </a:solidFill>
               </a:rPr>
               <a:pPr/>
-              <a:t>6/12/2010</a:t>
+              <a:t>6/27/2010</a:t>
             </a:fld>
             <a:endParaRPr lang="en-US"/>
           </a:p>
@@ -7398,7 +7408,7 @@
                 </a:solidFill>
               </a:rPr>
               <a:pPr/>
-              <a:t>6/12/2010</a:t>
+              <a:t>6/27/2010</a:t>
             </a:fld>
             <a:endParaRPr lang="en-US"/>
           </a:p>
@@ -7770,7 +7780,7 @@
                 </a:solidFill>
               </a:rPr>
               <a:pPr/>
-              <a:t>6/12/2010</a:t>
+              <a:t>6/27/2010</a:t>
             </a:fld>
             <a:endParaRPr lang="en-US"/>
           </a:p>
@@ -8142,7 +8152,7 @@
                 </a:solidFill>
               </a:rPr>
               <a:pPr/>
-              <a:t>6/12/2010</a:t>
+              <a:t>6/27/2010</a:t>
             </a:fld>
             <a:endParaRPr lang="en-US"/>
           </a:p>
@@ -8474,7 +8484,7 @@
                 </a:solidFill>
               </a:rPr>
               <a:pPr/>
-              <a:t>6/12/2010</a:t>
+              <a:t>6/27/2010</a:t>
             </a:fld>
             <a:endParaRPr lang="en-US"/>
           </a:p>
@@ -8996,7 +9006,7 @@
                 </a:solidFill>
               </a:rPr>
               <a:pPr/>
-              <a:t>6/12/2010</a:t>
+              <a:t>6/27/2010</a:t>
             </a:fld>
             <a:endParaRPr lang="en-US"/>
           </a:p>
@@ -9225,7 +9235,7 @@
                 </a:solidFill>
               </a:rPr>
               <a:pPr/>
-              <a:t>6/12/2010</a:t>
+              <a:t>6/27/2010</a:t>
             </a:fld>
             <a:endParaRPr lang="en-US" sz="1200" dirty="0">
               <a:solidFill>
@@ -12762,7 +12772,7 @@
         <p:spPr bwMode="auto">
           <a:xfrm>
             <a:off x="1235075" y="2438400"/>
-            <a:ext cx="5937844" cy="461665"/>
+            <a:ext cx="5759910" cy="461665"/>
           </a:xfrm>
           <a:prstGeom prst="rect">
             <a:avLst/>
@@ -12791,7 +12801,29 @@
                   </a:schemeClr>
                 </a:solidFill>
               </a:rPr>
-              <a:t>1.  MVC Template Authentication Type</a:t>
+              <a:t>1.  MVC Template </a:t>
+            </a:r>
+            <a:r>
+              <a:rPr lang="en-US" sz="2400" dirty="0" smtClean="0">
+                <a:solidFill>
+                  <a:schemeClr val="accent4">
+                    <a:lumMod val="60000"/>
+                    <a:lumOff val="40000"/>
+                  </a:schemeClr>
+                </a:solidFill>
+              </a:rPr>
+              <a:t>(</a:t>
+            </a:r>
+            <a:r>
+              <a:rPr lang="en-US" sz="2400" smtClean="0">
+                <a:solidFill>
+                  <a:schemeClr val="accent4">
+                    <a:lumMod val="60000"/>
+                    <a:lumOff val="40000"/>
+                  </a:schemeClr>
+                </a:solidFill>
+              </a:rPr>
+              <a:t>Account Controller)</a:t>
             </a:r>
             <a:endParaRPr lang="en-US" sz="2400" dirty="0">
               <a:solidFill>
@@ -13963,18 +13995,7 @@
                   </a:schemeClr>
                 </a:solidFill>
               </a:rPr>
-              <a:t>1.  </a:t>
-            </a:r>
-            <a:r>
-              <a:rPr lang="en-US" sz="2400" dirty="0" smtClean="0">
-                <a:solidFill>
-                  <a:schemeClr val="accent4">
-                    <a:lumMod val="60000"/>
-                    <a:lumOff val="40000"/>
-                  </a:schemeClr>
-                </a:solidFill>
-              </a:rPr>
-              <a:t>Helps enable function composition</a:t>
+              <a:t>1.  Helps enable function composition</a:t>
             </a:r>
             <a:endParaRPr lang="en-US" sz="2400" dirty="0">
               <a:solidFill>
@@ -14027,40 +14048,7 @@
                   </a:schemeClr>
                 </a:solidFill>
               </a:rPr>
-              <a:t>2. </a:t>
-            </a:r>
-            <a:r>
-              <a:rPr lang="en-US" sz="2400" dirty="0" smtClean="0">
-                <a:solidFill>
-                  <a:schemeClr val="accent4">
-                    <a:lumMod val="60000"/>
-                    <a:lumOff val="40000"/>
-                  </a:schemeClr>
-                </a:solidFill>
-              </a:rPr>
-              <a:t> </a:t>
-            </a:r>
-            <a:r>
-              <a:rPr lang="en-US" sz="2400" dirty="0" smtClean="0">
-                <a:solidFill>
-                  <a:schemeClr val="accent4">
-                    <a:lumMod val="60000"/>
-                    <a:lumOff val="40000"/>
-                  </a:schemeClr>
-                </a:solidFill>
-              </a:rPr>
-              <a:t>Follows </a:t>
-            </a:r>
-            <a:r>
-              <a:rPr lang="en-US" sz="2400" dirty="0" smtClean="0">
-                <a:solidFill>
-                  <a:schemeClr val="accent4">
-                    <a:lumMod val="60000"/>
-                    <a:lumOff val="40000"/>
-                  </a:schemeClr>
-                </a:solidFill>
-              </a:rPr>
-              <a:t>the Single Responsibility Principle (SRP)</a:t>
+              <a:t>2.  Follows the Single Responsibility Principle (SRP)</a:t>
             </a:r>
             <a:endParaRPr lang="en-US" sz="2400" dirty="0">
               <a:solidFill>
@@ -15081,7 +15069,7 @@
         <p:spPr bwMode="auto">
           <a:xfrm>
             <a:off x="1225550" y="3033713"/>
-            <a:ext cx="3504486" cy="461665"/>
+            <a:ext cx="3249608" cy="461665"/>
           </a:xfrm>
           <a:prstGeom prst="rect">
             <a:avLst/>
@@ -15121,7 +15109,7 @@
                   </a:schemeClr>
                 </a:solidFill>
               </a:rPr>
-              <a:t>FSharpCouch</a:t>
+              <a:t>WebSharper</a:t>
             </a:r>
             <a:r>
               <a:rPr lang="en-US" sz="2400" dirty="0" smtClean="0">
@@ -15132,7 +15120,7 @@
                   </a:schemeClr>
                 </a:solidFill>
               </a:rPr>
-              <a:t> Tests</a:t>
+              <a:t> 2010</a:t>
             </a:r>
             <a:endParaRPr lang="en-US" sz="2400" dirty="0">
               <a:solidFill>
@@ -15225,81 +15213,6 @@
               <a:latin typeface="+mj-lt"/>
               <a:ea typeface="+mj-ea"/>
               <a:cs typeface="+mj-cs"/>
-            </a:endParaRPr>
-          </a:p>
-        </p:txBody>
-      </p:sp>
-      <p:sp>
-        <p:nvSpPr>
-          <p:cNvPr id="6" name="Text Box 17"/>
-          <p:cNvSpPr txBox="1">
-            <a:spLocks noChangeArrowheads="1"/>
-          </p:cNvSpPr>
-          <p:nvPr/>
-        </p:nvSpPr>
-        <p:spPr bwMode="auto">
-          <a:xfrm>
-            <a:off x="1257204" y="3657600"/>
-            <a:ext cx="3249608" cy="461665"/>
-          </a:xfrm>
-          <a:prstGeom prst="rect">
-            <a:avLst/>
-          </a:prstGeom>
-          <a:noFill/>
-          <a:ln w="9525">
-            <a:noFill/>
-            <a:miter lim="800000"/>
-            <a:headEnd/>
-            <a:tailEnd/>
-          </a:ln>
-          <a:effectLst/>
-        </p:spPr>
-        <p:txBody>
-          <a:bodyPr wrap="none">
-            <a:spAutoFit/>
-          </a:bodyPr>
-          <a:lstStyle/>
-          <a:p>
-            <a:r>
-              <a:rPr lang="en-US" sz="2400" dirty="0" smtClean="0">
-                <a:solidFill>
-                  <a:schemeClr val="accent4">
-                    <a:lumMod val="60000"/>
-                    <a:lumOff val="40000"/>
-                  </a:schemeClr>
-                </a:solidFill>
-              </a:rPr>
-              <a:t>3.   </a:t>
-            </a:r>
-            <a:r>
-              <a:rPr lang="en-US" sz="2400" dirty="0" err="1" smtClean="0">
-                <a:solidFill>
-                  <a:schemeClr val="accent4">
-                    <a:lumMod val="60000"/>
-                    <a:lumOff val="40000"/>
-                  </a:schemeClr>
-                </a:solidFill>
-              </a:rPr>
-              <a:t>WebSharper</a:t>
-            </a:r>
-            <a:r>
-              <a:rPr lang="en-US" sz="2400" dirty="0" smtClean="0">
-                <a:solidFill>
-                  <a:schemeClr val="accent4">
-                    <a:lumMod val="60000"/>
-                    <a:lumOff val="40000"/>
-                  </a:schemeClr>
-                </a:solidFill>
-              </a:rPr>
-              <a:t> 2010</a:t>
-            </a:r>
-            <a:endParaRPr lang="en-US" sz="2400" dirty="0">
-              <a:solidFill>
-                <a:schemeClr val="accent4">
-                  <a:lumMod val="60000"/>
-                  <a:lumOff val="40000"/>
-                </a:schemeClr>
-              </a:solidFill>
             </a:endParaRPr>
           </a:p>
         </p:txBody>

</xml_diff>

<commit_message>
Added the active pattern types page to the slide deck
</commit_message>
<xml_diff>
--- a/5 Best Practices for F# Development.pptx
+++ b/5 Best Practices for F# Development.pptx
@@ -5,10 +5,10 @@
     <p:sldMasterId id="2147483648" r:id="rId1"/>
   </p:sldMasterIdLst>
   <p:notesMasterIdLst>
-    <p:notesMasterId r:id="rId23"/>
+    <p:notesMasterId r:id="rId24"/>
   </p:notesMasterIdLst>
   <p:handoutMasterIdLst>
-    <p:handoutMasterId r:id="rId24"/>
+    <p:handoutMasterId r:id="rId25"/>
   </p:handoutMasterIdLst>
   <p:sldIdLst>
     <p:sldId id="319" r:id="rId2"/>
@@ -28,10 +28,11 @@
     <p:sldId id="348" r:id="rId16"/>
     <p:sldId id="351" r:id="rId17"/>
     <p:sldId id="357" r:id="rId18"/>
-    <p:sldId id="350" r:id="rId19"/>
-    <p:sldId id="352" r:id="rId20"/>
-    <p:sldId id="358" r:id="rId21"/>
-    <p:sldId id="345" r:id="rId22"/>
+    <p:sldId id="361" r:id="rId19"/>
+    <p:sldId id="350" r:id="rId20"/>
+    <p:sldId id="352" r:id="rId21"/>
+    <p:sldId id="358" r:id="rId22"/>
+    <p:sldId id="345" r:id="rId23"/>
   </p:sldIdLst>
   <p:sldSz cx="9144000" cy="6858000" type="screen4x3"/>
   <p:notesSz cx="6858000" cy="9144000"/>
@@ -216,7 +217,7 @@
             <a:fld id="{68F88C59-319B-4332-9A1D-2A62CFCB00D8}" type="datetimeFigureOut">
               <a:rPr lang="en-US" smtClean="0"/>
               <a:pPr/>
-              <a:t>6/27/2010</a:t>
+              <a:t>7/5/2010</a:t>
             </a:fld>
             <a:endParaRPr lang="en-US"/>
           </a:p>
@@ -294,7 +295,7 @@
     </p:spTree>
     <p:extLst>
       <p:ext uri="{BB962C8B-B14F-4D97-AF65-F5344CB8AC3E}">
-        <p14:creationId xmlns:p14="http://schemas.microsoft.com/office/powerpoint/2010/main" val="838176901"/>
+        <p14:creationId xmlns:p14="http://schemas.microsoft.com/office/powerpoint/2010/main" xmlns="" val="838176901"/>
       </p:ext>
     </p:extLst>
   </p:cSld>
@@ -387,7 +388,7 @@
             <a:fld id="{968B300D-05F0-4B43-940D-46DED5A791AD}" type="datetimeFigureOut">
               <a:rPr lang="en-US" smtClean="0"/>
               <a:pPr/>
-              <a:t>6/27/2010</a:t>
+              <a:t>7/5/2010</a:t>
             </a:fld>
             <a:endParaRPr lang="en-US"/>
           </a:p>
@@ -565,7 +566,7 @@
     </p:spTree>
     <p:extLst>
       <p:ext uri="{BB962C8B-B14F-4D97-AF65-F5344CB8AC3E}">
-        <p14:creationId xmlns:p14="http://schemas.microsoft.com/office/powerpoint/2010/main" val="1188492307"/>
+        <p14:creationId xmlns:p14="http://schemas.microsoft.com/office/powerpoint/2010/main" xmlns="" val="1188492307"/>
       </p:ext>
     </p:extLst>
   </p:cSld>
@@ -1144,7 +1145,7 @@
             <a:fld id="{9B26CD33-4337-4529-948A-94F6960B2374}" type="slidenum">
               <a:rPr lang="en-US" smtClean="0"/>
               <a:pPr/>
-              <a:t>18</a:t>
+              <a:t>19</a:t>
             </a:fld>
             <a:endParaRPr lang="en-US"/>
           </a:p>
@@ -1458,7 +1459,7 @@
                 </a:solidFill>
               </a:rPr>
               <a:pPr/>
-              <a:t>6/27/2010</a:t>
+              <a:t>7/5/2010</a:t>
             </a:fld>
             <a:endParaRPr lang="en-US"/>
           </a:p>
@@ -1886,7 +1887,7 @@
                 </a:solidFill>
               </a:rPr>
               <a:pPr/>
-              <a:t>6/27/2010</a:t>
+              <a:t>7/5/2010</a:t>
             </a:fld>
             <a:endParaRPr lang="en-US"/>
           </a:p>
@@ -2257,7 +2258,7 @@
                 </a:solidFill>
               </a:rPr>
               <a:pPr/>
-              <a:t>6/27/2010</a:t>
+              <a:t>7/5/2010</a:t>
             </a:fld>
             <a:endParaRPr lang="en-US"/>
           </a:p>
@@ -2862,7 +2863,7 @@
                 </a:solidFill>
               </a:rPr>
               <a:pPr/>
-              <a:t>6/27/2010</a:t>
+              <a:t>7/5/2010</a:t>
             </a:fld>
             <a:endParaRPr lang="en-US"/>
           </a:p>
@@ -3448,7 +3449,7 @@
                 </a:solidFill>
               </a:rPr>
               <a:pPr/>
-              <a:t>6/27/2010</a:t>
+              <a:t>7/5/2010</a:t>
             </a:fld>
             <a:endParaRPr lang="en-US"/>
           </a:p>
@@ -3926,7 +3927,7 @@
                 </a:solidFill>
               </a:rPr>
               <a:pPr/>
-              <a:t>6/27/2010</a:t>
+              <a:t>7/5/2010</a:t>
             </a:fld>
             <a:endParaRPr lang="en-US"/>
           </a:p>
@@ -4368,7 +4369,7 @@
                 </a:solidFill>
               </a:rPr>
               <a:pPr/>
-              <a:t>6/27/2010</a:t>
+              <a:t>7/5/2010</a:t>
             </a:fld>
             <a:endParaRPr lang="en-US"/>
           </a:p>
@@ -4893,7 +4894,7 @@
                 </a:solidFill>
               </a:rPr>
               <a:pPr/>
-              <a:t>6/27/2010</a:t>
+              <a:t>7/5/2010</a:t>
             </a:fld>
             <a:endParaRPr lang="en-US"/>
           </a:p>
@@ -5418,7 +5419,7 @@
                 </a:solidFill>
               </a:rPr>
               <a:pPr/>
-              <a:t>6/27/2010</a:t>
+              <a:t>7/5/2010</a:t>
             </a:fld>
             <a:endParaRPr lang="en-US"/>
           </a:p>
@@ -5647,7 +5648,7 @@
                 </a:solidFill>
               </a:rPr>
               <a:pPr/>
-              <a:t>6/27/2010</a:t>
+              <a:t>7/5/2010</a:t>
             </a:fld>
             <a:endParaRPr lang="en-US"/>
           </a:p>
@@ -5995,7 +5996,7 @@
                 </a:solidFill>
               </a:rPr>
               <a:pPr/>
-              <a:t>6/27/2010</a:t>
+              <a:t>7/5/2010</a:t>
             </a:fld>
             <a:endParaRPr lang="en-US"/>
           </a:p>
@@ -6241,7 +6242,7 @@
                 </a:solidFill>
               </a:rPr>
               <a:pPr/>
-              <a:t>6/27/2010</a:t>
+              <a:t>7/5/2010</a:t>
             </a:fld>
             <a:endParaRPr lang="en-US"/>
           </a:p>
@@ -6470,7 +6471,7 @@
                 </a:solidFill>
               </a:rPr>
               <a:pPr/>
-              <a:t>6/27/2010</a:t>
+              <a:t>7/5/2010</a:t>
             </a:fld>
             <a:endParaRPr lang="en-US"/>
           </a:p>
@@ -6655,7 +6656,7 @@
             <a:fld id="{ACB2EC6F-6501-4E04-BD6C-A8A6CABB2C5B}" type="datetimeFigureOut">
               <a:rPr lang="en-US" smtClean="0"/>
               <a:pPr/>
-              <a:t>6/27/2010</a:t>
+              <a:t>7/5/2010</a:t>
             </a:fld>
             <a:endParaRPr lang="en-US"/>
           </a:p>
@@ -6913,7 +6914,7 @@
                 </a:solidFill>
               </a:rPr>
               <a:pPr/>
-              <a:t>6/27/2010</a:t>
+              <a:t>7/5/2010</a:t>
             </a:fld>
             <a:endParaRPr lang="en-US"/>
           </a:p>
@@ -7408,7 +7409,7 @@
                 </a:solidFill>
               </a:rPr>
               <a:pPr/>
-              <a:t>6/27/2010</a:t>
+              <a:t>7/5/2010</a:t>
             </a:fld>
             <a:endParaRPr lang="en-US"/>
           </a:p>
@@ -7780,7 +7781,7 @@
                 </a:solidFill>
               </a:rPr>
               <a:pPr/>
-              <a:t>6/27/2010</a:t>
+              <a:t>7/5/2010</a:t>
             </a:fld>
             <a:endParaRPr lang="en-US"/>
           </a:p>
@@ -8152,7 +8153,7 @@
                 </a:solidFill>
               </a:rPr>
               <a:pPr/>
-              <a:t>6/27/2010</a:t>
+              <a:t>7/5/2010</a:t>
             </a:fld>
             <a:endParaRPr lang="en-US"/>
           </a:p>
@@ -8484,7 +8485,7 @@
                 </a:solidFill>
               </a:rPr>
               <a:pPr/>
-              <a:t>6/27/2010</a:t>
+              <a:t>7/5/2010</a:t>
             </a:fld>
             <a:endParaRPr lang="en-US"/>
           </a:p>
@@ -9006,7 +9007,7 @@
                 </a:solidFill>
               </a:rPr>
               <a:pPr/>
-              <a:t>6/27/2010</a:t>
+              <a:t>7/5/2010</a:t>
             </a:fld>
             <a:endParaRPr lang="en-US"/>
           </a:p>
@@ -9235,7 +9236,7 @@
                 </a:solidFill>
               </a:rPr>
               <a:pPr/>
-              <a:t>6/27/2010</a:t>
+              <a:t>7/5/2010</a:t>
             </a:fld>
             <a:endParaRPr lang="en-US" sz="1200" dirty="0">
               <a:solidFill>
@@ -11525,8 +11526,8 @@
         </p:nvSpPr>
         <p:spPr bwMode="auto">
           <a:xfrm>
-            <a:off x="1235075" y="2438400"/>
-            <a:ext cx="6381875" cy="461665"/>
+            <a:off x="1219200" y="1066800"/>
+            <a:ext cx="6629399" cy="4893647"/>
           </a:xfrm>
           <a:prstGeom prst="rect">
             <a:avLst/>
@@ -11541,11 +11542,14 @@
           <a:effectLst/>
         </p:spPr>
         <p:txBody>
-          <a:bodyPr wrap="none">
+          <a:bodyPr wrap="square">
             <a:spAutoFit/>
           </a:bodyPr>
           <a:lstStyle/>
           <a:p>
+            <a:pPr marL="457200" indent="-457200">
+              <a:buAutoNum type="arabicPeriod"/>
+            </a:pPr>
             <a:r>
               <a:rPr lang="en-US" sz="2400" dirty="0" smtClean="0">
                 <a:solidFill>
@@ -11555,9 +11559,46 @@
                   </a:schemeClr>
                 </a:solidFill>
               </a:rPr>
-              <a:t>1.  Example of Active Patterns (XML parse)</a:t>
-            </a:r>
-            <a:endParaRPr lang="en-US" sz="2400" dirty="0">
+              <a:t>Single-Case</a:t>
+            </a:r>
+          </a:p>
+          <a:p>
+            <a:pPr marL="457200" indent="-457200"/>
+            <a:r>
+              <a:rPr lang="en-US" sz="2400" dirty="0" smtClean="0">
+                <a:solidFill>
+                  <a:schemeClr val="accent4">
+                    <a:lumMod val="60000"/>
+                    <a:lumOff val="40000"/>
+                  </a:schemeClr>
+                </a:solidFill>
+              </a:rPr>
+              <a:t>Example: </a:t>
+            </a:r>
+            <a:r>
+              <a:rPr lang="en-US" sz="2400" dirty="0" smtClean="0"/>
+              <a:t>let </a:t>
+            </a:r>
+            <a:r>
+              <a:rPr lang="en-US" sz="2400" dirty="0" smtClean="0"/>
+              <a:t>(|</a:t>
+            </a:r>
+            <a:r>
+              <a:rPr lang="en-US" sz="2400" dirty="0" err="1" smtClean="0"/>
+              <a:t>UpperCase</a:t>
+            </a:r>
+            <a:r>
+              <a:rPr lang="en-US" sz="2400" dirty="0" smtClean="0"/>
+              <a:t>|) (x:string) </a:t>
+            </a:r>
+            <a:r>
+              <a:rPr lang="en-US" sz="2400" dirty="0" smtClean="0"/>
+              <a:t>=…</a:t>
+            </a:r>
+          </a:p>
+          <a:p>
+            <a:pPr marL="457200" indent="-457200"/>
+            <a:endParaRPr lang="en-US" sz="2400" dirty="0" smtClean="0">
               <a:solidFill>
                 <a:schemeClr val="accent4">
                   <a:lumMod val="60000"/>
@@ -11566,39 +11607,11 @@
               </a:solidFill>
             </a:endParaRPr>
           </a:p>
-        </p:txBody>
-      </p:sp>
-      <p:sp>
-        <p:nvSpPr>
-          <p:cNvPr id="10" name="Text Box 17"/>
-          <p:cNvSpPr txBox="1">
-            <a:spLocks noChangeArrowheads="1"/>
-          </p:cNvSpPr>
-          <p:nvPr/>
-        </p:nvSpPr>
-        <p:spPr bwMode="auto">
-          <a:xfrm>
-            <a:off x="1225550" y="3033713"/>
-            <a:ext cx="4974439" cy="830997"/>
-          </a:xfrm>
-          <a:prstGeom prst="rect">
-            <a:avLst/>
-          </a:prstGeom>
-          <a:noFill/>
-          <a:ln w="9525">
-            <a:noFill/>
-            <a:miter lim="800000"/>
-            <a:headEnd/>
-            <a:tailEnd/>
-          </a:ln>
-          <a:effectLst/>
-        </p:spPr>
-        <p:txBody>
-          <a:bodyPr wrap="none">
-            <a:spAutoFit/>
-          </a:bodyPr>
-          <a:lstStyle/>
-          <a:p>
+          <a:p>
+            <a:pPr marL="457200" indent="-457200">
+              <a:buFont typeface="+mj-lt"/>
+              <a:buAutoNum type="arabicPeriod" startAt="2"/>
+            </a:pPr>
             <a:r>
               <a:rPr lang="en-US" sz="2400" dirty="0" smtClean="0">
                 <a:solidFill>
@@ -11608,11 +11621,236 @@
                   </a:schemeClr>
                 </a:solidFill>
               </a:rPr>
-              <a:t>2.  Node Join in Polyphony (DHT)</a:t>
-            </a:r>
-          </a:p>
-          <a:p>
-            <a:endParaRPr lang="en-US" sz="2400" dirty="0">
+              <a:t>Multi-Case</a:t>
+            </a:r>
+          </a:p>
+          <a:p>
+            <a:pPr marL="457200" indent="-457200"/>
+            <a:r>
+              <a:rPr lang="en-US" sz="2400" dirty="0" smtClean="0">
+                <a:solidFill>
+                  <a:schemeClr val="accent4">
+                    <a:lumMod val="60000"/>
+                    <a:lumOff val="40000"/>
+                  </a:schemeClr>
+                </a:solidFill>
+              </a:rPr>
+              <a:t>Example</a:t>
+            </a:r>
+            <a:r>
+              <a:rPr lang="en-US" sz="2400" dirty="0" smtClean="0">
+                <a:solidFill>
+                  <a:schemeClr val="accent4">
+                    <a:lumMod val="60000"/>
+                    <a:lumOff val="40000"/>
+                  </a:schemeClr>
+                </a:solidFill>
+              </a:rPr>
+              <a:t>:</a:t>
+            </a:r>
+            <a:r>
+              <a:rPr lang="en-US" sz="2400" dirty="0" smtClean="0"/>
+              <a:t> let (|</a:t>
+            </a:r>
+            <a:r>
+              <a:rPr lang="en-US" sz="2400" dirty="0" err="1" smtClean="0"/>
+              <a:t>Odd|Even</a:t>
+            </a:r>
+            <a:r>
+              <a:rPr lang="en-US" sz="2400" dirty="0" smtClean="0"/>
+              <a:t>|) x </a:t>
+            </a:r>
+            <a:r>
+              <a:rPr lang="en-US" sz="2400" dirty="0" smtClean="0"/>
+              <a:t>=…</a:t>
+            </a:r>
+          </a:p>
+          <a:p>
+            <a:pPr marL="457200" indent="-457200"/>
+            <a:endParaRPr lang="en-US" sz="2400" dirty="0" smtClean="0">
+              <a:solidFill>
+                <a:schemeClr val="accent4">
+                  <a:lumMod val="60000"/>
+                  <a:lumOff val="40000"/>
+                </a:schemeClr>
+              </a:solidFill>
+            </a:endParaRPr>
+          </a:p>
+          <a:p>
+            <a:pPr marL="457200" indent="-457200">
+              <a:buFont typeface="+mj-lt"/>
+              <a:buAutoNum type="arabicPeriod" startAt="3"/>
+            </a:pPr>
+            <a:r>
+              <a:rPr lang="en-US" sz="2400" dirty="0" smtClean="0">
+                <a:solidFill>
+                  <a:schemeClr val="accent4">
+                    <a:lumMod val="60000"/>
+                    <a:lumOff val="40000"/>
+                  </a:schemeClr>
+                </a:solidFill>
+              </a:rPr>
+              <a:t>Partial</a:t>
+            </a:r>
+          </a:p>
+          <a:p>
+            <a:pPr marL="457200" indent="-457200"/>
+            <a:r>
+              <a:rPr lang="en-US" sz="2400" dirty="0" smtClean="0">
+                <a:solidFill>
+                  <a:schemeClr val="accent4">
+                    <a:lumMod val="60000"/>
+                    <a:lumOff val="40000"/>
+                  </a:schemeClr>
+                </a:solidFill>
+              </a:rPr>
+              <a:t>Example</a:t>
+            </a:r>
+            <a:r>
+              <a:rPr lang="en-US" sz="2400" dirty="0" smtClean="0">
+                <a:solidFill>
+                  <a:schemeClr val="accent4">
+                    <a:lumMod val="60000"/>
+                    <a:lumOff val="40000"/>
+                  </a:schemeClr>
+                </a:solidFill>
+              </a:rPr>
+              <a:t>: </a:t>
+            </a:r>
+            <a:r>
+              <a:rPr lang="en-US" sz="2400" dirty="0" smtClean="0"/>
+              <a:t>let (|</a:t>
+            </a:r>
+            <a:r>
+              <a:rPr lang="en-US" sz="2400" dirty="0" err="1" smtClean="0"/>
+              <a:t>DivisibleByTwo</a:t>
+            </a:r>
+            <a:r>
+              <a:rPr lang="en-US" sz="2400" dirty="0" smtClean="0"/>
+              <a:t>|_|) </a:t>
+            </a:r>
+            <a:r>
+              <a:rPr lang="en-US" sz="2400" dirty="0" smtClean="0"/>
+              <a:t>input </a:t>
+            </a:r>
+            <a:r>
+              <a:rPr lang="en-US" sz="2400" dirty="0" smtClean="0"/>
+              <a:t>=…</a:t>
+            </a:r>
+          </a:p>
+          <a:p>
+            <a:pPr marL="457200" indent="-457200"/>
+            <a:endParaRPr lang="en-US" sz="2400" dirty="0" smtClean="0">
+              <a:solidFill>
+                <a:schemeClr val="accent4">
+                  <a:lumMod val="60000"/>
+                  <a:lumOff val="40000"/>
+                </a:schemeClr>
+              </a:solidFill>
+            </a:endParaRPr>
+          </a:p>
+          <a:p>
+            <a:pPr marL="457200" indent="-457200">
+              <a:buFont typeface="+mj-lt"/>
+              <a:buAutoNum type="arabicPeriod" startAt="4"/>
+            </a:pPr>
+            <a:r>
+              <a:rPr lang="en-US" sz="2400" dirty="0" smtClean="0">
+                <a:solidFill>
+                  <a:schemeClr val="accent4">
+                    <a:lumMod val="60000"/>
+                    <a:lumOff val="40000"/>
+                  </a:schemeClr>
+                </a:solidFill>
+              </a:rPr>
+              <a:t>Parameterized</a:t>
+            </a:r>
+          </a:p>
+          <a:p>
+            <a:pPr marL="457200" indent="-457200"/>
+            <a:r>
+              <a:rPr lang="en-US" sz="2400" dirty="0" smtClean="0">
+                <a:solidFill>
+                  <a:schemeClr val="accent4">
+                    <a:lumMod val="60000"/>
+                    <a:lumOff val="40000"/>
+                  </a:schemeClr>
+                </a:solidFill>
+              </a:rPr>
+              <a:t>Example</a:t>
+            </a:r>
+            <a:r>
+              <a:rPr lang="en-US" sz="2400" dirty="0" smtClean="0">
+                <a:solidFill>
+                  <a:schemeClr val="accent4">
+                    <a:lumMod val="60000"/>
+                    <a:lumOff val="40000"/>
+                  </a:schemeClr>
+                </a:solidFill>
+              </a:rPr>
+              <a:t>: </a:t>
+            </a:r>
+            <a:r>
+              <a:rPr lang="en-US" sz="2400" dirty="0" smtClean="0"/>
+              <a:t>let (|</a:t>
+            </a:r>
+            <a:r>
+              <a:rPr lang="en-US" sz="2400" dirty="0" err="1" smtClean="0"/>
+              <a:t>MultipleOf</a:t>
+            </a:r>
+            <a:r>
+              <a:rPr lang="en-US" sz="2400" dirty="0" smtClean="0"/>
+              <a:t>|_|) x </a:t>
+            </a:r>
+            <a:r>
+              <a:rPr lang="en-US" sz="2400" dirty="0" smtClean="0"/>
+              <a:t>input = …</a:t>
+            </a:r>
+            <a:endParaRPr lang="en-US" sz="2400" dirty="0" smtClean="0">
+              <a:solidFill>
+                <a:schemeClr val="accent4">
+                  <a:lumMod val="60000"/>
+                  <a:lumOff val="40000"/>
+                </a:schemeClr>
+              </a:solidFill>
+            </a:endParaRPr>
+          </a:p>
+          <a:p>
+            <a:pPr marL="457200" indent="-457200"/>
+            <a:endParaRPr lang="en-US" sz="2400" dirty="0" smtClean="0">
+              <a:solidFill>
+                <a:schemeClr val="accent4">
+                  <a:lumMod val="60000"/>
+                  <a:lumOff val="40000"/>
+                </a:schemeClr>
+              </a:solidFill>
+            </a:endParaRPr>
+          </a:p>
+          <a:p>
+            <a:pPr marL="457200" indent="-457200"/>
+            <a:r>
+              <a:rPr lang="en-US" sz="2400" dirty="0" smtClean="0">
+                <a:solidFill>
+                  <a:schemeClr val="accent4">
+                    <a:lumMod val="60000"/>
+                    <a:lumOff val="40000"/>
+                  </a:schemeClr>
+                </a:solidFill>
+              </a:rPr>
+              <a:t>- http</a:t>
+            </a:r>
+            <a:r>
+              <a:rPr lang="en-US" sz="2400" dirty="0" smtClean="0">
+                <a:solidFill>
+                  <a:schemeClr val="accent4">
+                    <a:lumMod val="60000"/>
+                    <a:lumOff val="40000"/>
+                  </a:schemeClr>
+                </a:solidFill>
+              </a:rPr>
+              <a:t>://blogs.msdn.com/b/chrsmith/</a:t>
+            </a:r>
+            <a:endParaRPr lang="en-US" sz="2400" dirty="0" smtClean="0">
               <a:solidFill>
                 <a:schemeClr val="accent4">
                   <a:lumMod val="60000"/>
@@ -11682,7 +11920,7 @@
                 <a:ea typeface="+mj-ea"/>
                 <a:cs typeface="+mj-cs"/>
               </a:rPr>
-              <a:t>Examples</a:t>
+              <a:t>Type of active patterns</a:t>
             </a:r>
             <a:endParaRPr kumimoji="0" lang="en-US" sz="4000" b="0" i="0" u="none" strike="noStrike" kern="0" cap="all" spc="0" normalizeH="0" baseline="0" noProof="0" dirty="0">
               <a:ln>
@@ -11744,100 +11982,134 @@
       </p:grpSpPr>
       <p:sp>
         <p:nvSpPr>
-          <p:cNvPr id="11" name="W¥ل云玗İαЂÕØÚáÛ丫:Téxt Plàçèhòlðêr 表¥鷗字㌍_W 10"/>
+          <p:cNvPr id="3" name="Text Placeholder 2"/>
           <p:cNvSpPr>
             <a:spLocks noGrp="1"/>
           </p:cNvSpPr>
           <p:nvPr>
-            <p:ph type="body" sz="quarter" idx="13"/>
-          </p:nvPr>
-        </p:nvSpPr>
-        <p:spPr>
-          <a:xfrm>
-            <a:off x="4648200" y="1371600"/>
-            <a:ext cx="4191000" cy="5486400"/>
-          </a:xfrm>
-        </p:spPr>
+            <p:ph type="body" sz="quarter" idx="11"/>
+          </p:nvPr>
+        </p:nvSpPr>
+        <p:spPr/>
         <p:txBody>
           <a:bodyPr/>
-          <a:lstStyle>
-            <a:extLst/>
-          </a:lstStyle>
-          <a:p>
-            <a:endParaRPr lang="en-US" sz="1800" dirty="0" smtClean="0"/>
-          </a:p>
-          <a:p>
-            <a:endParaRPr lang="en-US" dirty="0" smtClean="0"/>
-          </a:p>
-          <a:p>
-            <a:endParaRPr lang="en-US" sz="1800" dirty="0" smtClean="0"/>
-          </a:p>
-          <a:p>
-            <a:endParaRPr lang="en-US" sz="1800" dirty="0" smtClean="0"/>
-          </a:p>
-          <a:p>
-            <a:r>
-              <a:rPr lang="en-US" sz="2400" dirty="0" smtClean="0"/>
-              <a:t>Prefer pattern matching to if/else syntax.</a:t>
-            </a:r>
-          </a:p>
-          <a:p>
-            <a:endParaRPr lang="en-US" dirty="0" smtClean="0"/>
-          </a:p>
-          <a:p>
-            <a:endParaRPr lang="en-US" sz="1800" dirty="0" smtClean="0"/>
-          </a:p>
-          <a:p>
-            <a:endParaRPr lang="en-US" dirty="0" smtClean="0"/>
-          </a:p>
-        </p:txBody>
-      </p:sp>
-      <p:pic>
-        <p:nvPicPr>
-          <p:cNvPr id="13" name="trees_j0202227.png"/>
-          <p:cNvPicPr>
-            <a:picLocks noGrp="1" noChangeAspect="1"/>
-          </p:cNvPicPr>
-          <p:nvPr>
-            <p:ph type="pic" sz="quarter" idx="11"/>
-          </p:nvPr>
-        </p:nvPicPr>
-        <p:blipFill>
-          <a:blip r:embed="rId3" cstate="print"/>
-          <a:srcRect/>
-          <a:stretch>
-            <a:fillRect/>
-          </a:stretch>
-        </p:blipFill>
-        <p:spPr>
-          <a:xfrm>
-            <a:off x="457200" y="1219200"/>
-            <a:ext cx="4038600" cy="5384800"/>
-          </a:xfrm>
-          <a:prstGeom prst="roundRect">
-            <a:avLst>
-              <a:gd name="adj" fmla="val 16667"/>
-            </a:avLst>
+          <a:lstStyle/>
+          <a:p>
+            <a:endParaRPr lang="en-US"/>
+          </a:p>
+        </p:txBody>
+      </p:sp>
+      <p:sp>
+        <p:nvSpPr>
+          <p:cNvPr id="9" name="Text Box 16"/>
+          <p:cNvSpPr txBox="1">
+            <a:spLocks noChangeArrowheads="1"/>
+          </p:cNvSpPr>
+          <p:nvPr/>
+        </p:nvSpPr>
+        <p:spPr bwMode="auto">
+          <a:xfrm>
+            <a:off x="1235075" y="2438400"/>
+            <a:ext cx="6381875" cy="461665"/>
+          </a:xfrm>
+          <a:prstGeom prst="rect">
+            <a:avLst/>
           </a:prstGeom>
           <a:noFill/>
-          <a:ln w="38100" cap="sq" cmpd="sng" algn="ctr">
+          <a:ln w="9525">
             <a:noFill/>
-            <a:prstDash val="solid"/>
             <a:miter lim="800000"/>
+            <a:headEnd/>
+            <a:tailEnd/>
           </a:ln>
-          <a:effectLst>
-            <a:outerShdw blurRad="63500" dist="76200" dir="2700000" algn="tl" rotWithShape="0">
-              <a:srgbClr val="000000">
-                <a:alpha val="70000"/>
-              </a:srgbClr>
-            </a:outerShdw>
-            <a:softEdge rad="31750"/>
-          </a:effectLst>
-        </p:spPr>
-      </p:pic>
-      <p:sp>
-        <p:nvSpPr>
-          <p:cNvPr id="6" name="Rectangle 6"/>
+          <a:effectLst/>
+        </p:spPr>
+        <p:txBody>
+          <a:bodyPr wrap="none">
+            <a:spAutoFit/>
+          </a:bodyPr>
+          <a:lstStyle/>
+          <a:p>
+            <a:r>
+              <a:rPr lang="en-US" sz="2400" dirty="0" smtClean="0">
+                <a:solidFill>
+                  <a:schemeClr val="accent4">
+                    <a:lumMod val="60000"/>
+                    <a:lumOff val="40000"/>
+                  </a:schemeClr>
+                </a:solidFill>
+              </a:rPr>
+              <a:t>1.  Example of Active Patterns (XML parse)</a:t>
+            </a:r>
+            <a:endParaRPr lang="en-US" sz="2400" dirty="0">
+              <a:solidFill>
+                <a:schemeClr val="accent4">
+                  <a:lumMod val="60000"/>
+                  <a:lumOff val="40000"/>
+                </a:schemeClr>
+              </a:solidFill>
+            </a:endParaRPr>
+          </a:p>
+        </p:txBody>
+      </p:sp>
+      <p:sp>
+        <p:nvSpPr>
+          <p:cNvPr id="10" name="Text Box 17"/>
+          <p:cNvSpPr txBox="1">
+            <a:spLocks noChangeArrowheads="1"/>
+          </p:cNvSpPr>
+          <p:nvPr/>
+        </p:nvSpPr>
+        <p:spPr bwMode="auto">
+          <a:xfrm>
+            <a:off x="1225550" y="3033713"/>
+            <a:ext cx="4974439" cy="830997"/>
+          </a:xfrm>
+          <a:prstGeom prst="rect">
+            <a:avLst/>
+          </a:prstGeom>
+          <a:noFill/>
+          <a:ln w="9525">
+            <a:noFill/>
+            <a:miter lim="800000"/>
+            <a:headEnd/>
+            <a:tailEnd/>
+          </a:ln>
+          <a:effectLst/>
+        </p:spPr>
+        <p:txBody>
+          <a:bodyPr wrap="none">
+            <a:spAutoFit/>
+          </a:bodyPr>
+          <a:lstStyle/>
+          <a:p>
+            <a:r>
+              <a:rPr lang="en-US" sz="2400" dirty="0" smtClean="0">
+                <a:solidFill>
+                  <a:schemeClr val="accent4">
+                    <a:lumMod val="60000"/>
+                    <a:lumOff val="40000"/>
+                  </a:schemeClr>
+                </a:solidFill>
+              </a:rPr>
+              <a:t>2.  Node Join in Polyphony (DHT)</a:t>
+            </a:r>
+          </a:p>
+          <a:p>
+            <a:endParaRPr lang="en-US" sz="2400" dirty="0">
+              <a:solidFill>
+                <a:schemeClr val="accent4">
+                  <a:lumMod val="60000"/>
+                  <a:lumOff val="40000"/>
+                </a:schemeClr>
+              </a:solidFill>
+            </a:endParaRPr>
+          </a:p>
+        </p:txBody>
+      </p:sp>
+      <p:sp>
+        <p:nvSpPr>
+          <p:cNvPr id="11" name="Rectangle 6"/>
           <p:cNvSpPr txBox="1">
             <a:spLocks noChangeArrowheads="1"/>
           </p:cNvSpPr>
@@ -11894,30 +12166,7 @@
                 <a:ea typeface="+mj-ea"/>
                 <a:cs typeface="+mj-cs"/>
               </a:rPr>
-              <a:t>Pattern</a:t>
-            </a:r>
-            <a:r>
-              <a:rPr kumimoji="0" lang="en-US" sz="4000" b="0" i="0" u="none" strike="noStrike" kern="0" cap="all" spc="0" normalizeH="0" noProof="0" dirty="0" smtClean="0">
-                <a:ln>
-                  <a:noFill/>
-                </a:ln>
-                <a:solidFill>
-                  <a:schemeClr val="tx2"/>
-                </a:solidFill>
-                <a:effectLst>
-                  <a:outerShdw blurRad="51000" dist="37000" dir="5400000" algn="tl" rotWithShape="0">
-                    <a:srgbClr val="000000">
-                      <a:alpha val="25000"/>
-                    </a:srgbClr>
-                  </a:outerShdw>
-                </a:effectLst>
-                <a:uLnTx/>
-                <a:uFillTx/>
-                <a:latin typeface="+mj-lt"/>
-                <a:ea typeface="+mj-ea"/>
-                <a:cs typeface="+mj-cs"/>
-              </a:rPr>
-              <a:t> Matching</a:t>
+              <a:t>Examples</a:t>
             </a:r>
             <a:endParaRPr kumimoji="0" lang="en-US" sz="4000" b="0" i="0" u="none" strike="noStrike" kern="0" cap="all" spc="0" normalizeH="0" baseline="0" noProof="0" dirty="0">
               <a:ln>
@@ -11979,79 +12228,100 @@
       </p:grpSpPr>
       <p:sp>
         <p:nvSpPr>
-          <p:cNvPr id="3" name="Text Placeholder 2"/>
+          <p:cNvPr id="11" name="W¥ل云玗İαЂÕØÚáÛ丫:Téxt Plàçèhòlðêr 表¥鷗字㌍_W 10"/>
           <p:cNvSpPr>
             <a:spLocks noGrp="1"/>
           </p:cNvSpPr>
           <p:nvPr>
-            <p:ph type="body" sz="quarter" idx="11"/>
-          </p:nvPr>
-        </p:nvSpPr>
-        <p:spPr/>
+            <p:ph type="body" sz="quarter" idx="13"/>
+          </p:nvPr>
+        </p:nvSpPr>
+        <p:spPr>
+          <a:xfrm>
+            <a:off x="4648200" y="1371600"/>
+            <a:ext cx="4191000" cy="5486400"/>
+          </a:xfrm>
+        </p:spPr>
         <p:txBody>
           <a:bodyPr/>
-          <a:lstStyle/>
-          <a:p>
-            <a:endParaRPr lang="en-US"/>
-          </a:p>
-        </p:txBody>
-      </p:sp>
-      <p:sp>
-        <p:nvSpPr>
-          <p:cNvPr id="9" name="Text Box 16"/>
-          <p:cNvSpPr txBox="1">
-            <a:spLocks noChangeArrowheads="1"/>
-          </p:cNvSpPr>
-          <p:nvPr/>
-        </p:nvSpPr>
-        <p:spPr bwMode="auto">
-          <a:xfrm>
-            <a:off x="1235075" y="2438400"/>
-            <a:ext cx="5325497" cy="461665"/>
-          </a:xfrm>
-          <a:prstGeom prst="rect">
-            <a:avLst/>
+          <a:lstStyle>
+            <a:extLst/>
+          </a:lstStyle>
+          <a:p>
+            <a:endParaRPr lang="en-US" sz="1800" dirty="0" smtClean="0"/>
+          </a:p>
+          <a:p>
+            <a:endParaRPr lang="en-US" dirty="0" smtClean="0"/>
+          </a:p>
+          <a:p>
+            <a:endParaRPr lang="en-US" sz="1800" dirty="0" smtClean="0"/>
+          </a:p>
+          <a:p>
+            <a:endParaRPr lang="en-US" sz="1800" dirty="0" smtClean="0"/>
+          </a:p>
+          <a:p>
+            <a:r>
+              <a:rPr lang="en-US" sz="2400" dirty="0" smtClean="0"/>
+              <a:t>Prefer pattern matching to if/else syntax.</a:t>
+            </a:r>
+          </a:p>
+          <a:p>
+            <a:endParaRPr lang="en-US" dirty="0" smtClean="0"/>
+          </a:p>
+          <a:p>
+            <a:endParaRPr lang="en-US" sz="1800" dirty="0" smtClean="0"/>
+          </a:p>
+          <a:p>
+            <a:endParaRPr lang="en-US" dirty="0" smtClean="0"/>
+          </a:p>
+        </p:txBody>
+      </p:sp>
+      <p:pic>
+        <p:nvPicPr>
+          <p:cNvPr id="13" name="trees_j0202227.png"/>
+          <p:cNvPicPr>
+            <a:picLocks noGrp="1" noChangeAspect="1"/>
+          </p:cNvPicPr>
+          <p:nvPr>
+            <p:ph type="pic" sz="quarter" idx="11"/>
+          </p:nvPr>
+        </p:nvPicPr>
+        <p:blipFill>
+          <a:blip r:embed="rId3" cstate="print"/>
+          <a:srcRect/>
+          <a:stretch>
+            <a:fillRect/>
+          </a:stretch>
+        </p:blipFill>
+        <p:spPr>
+          <a:xfrm>
+            <a:off x="457200" y="1219200"/>
+            <a:ext cx="4038600" cy="5384800"/>
+          </a:xfrm>
+          <a:prstGeom prst="roundRect">
+            <a:avLst>
+              <a:gd name="adj" fmla="val 16667"/>
+            </a:avLst>
           </a:prstGeom>
           <a:noFill/>
-          <a:ln w="9525">
+          <a:ln w="38100" cap="sq" cmpd="sng" algn="ctr">
             <a:noFill/>
+            <a:prstDash val="solid"/>
             <a:miter lim="800000"/>
-            <a:headEnd/>
-            <a:tailEnd/>
           </a:ln>
-          <a:effectLst/>
-        </p:spPr>
-        <p:txBody>
-          <a:bodyPr wrap="none">
-            <a:spAutoFit/>
-          </a:bodyPr>
-          <a:lstStyle/>
-          <a:p>
-            <a:r>
-              <a:rPr lang="en-US" sz="2400" dirty="0" smtClean="0">
-                <a:solidFill>
-                  <a:schemeClr val="accent4">
-                    <a:lumMod val="60000"/>
-                    <a:lumOff val="40000"/>
-                  </a:schemeClr>
-                </a:solidFill>
-              </a:rPr>
-              <a:t>1.  Makes your code easier to extend</a:t>
-            </a:r>
-            <a:endParaRPr lang="en-US" sz="2400" dirty="0">
-              <a:solidFill>
-                <a:schemeClr val="accent4">
-                  <a:lumMod val="60000"/>
-                  <a:lumOff val="40000"/>
-                </a:schemeClr>
-              </a:solidFill>
-            </a:endParaRPr>
-          </a:p>
-        </p:txBody>
-      </p:sp>
-      <p:sp>
-        <p:nvSpPr>
-          <p:cNvPr id="11" name="Rectangle 6"/>
+          <a:effectLst>
+            <a:outerShdw blurRad="63500" dist="76200" dir="2700000" algn="tl" rotWithShape="0">
+              <a:srgbClr val="000000">
+                <a:alpha val="70000"/>
+              </a:srgbClr>
+            </a:outerShdw>
+            <a:softEdge rad="31750"/>
+          </a:effectLst>
+        </p:spPr>
+      </p:pic>
+      <p:sp>
+        <p:nvSpPr>
+          <p:cNvPr id="6" name="Rectangle 6"/>
           <p:cNvSpPr txBox="1">
             <a:spLocks noChangeArrowheads="1"/>
           </p:cNvSpPr>
@@ -12108,7 +12378,7 @@
                 <a:ea typeface="+mj-ea"/>
                 <a:cs typeface="+mj-cs"/>
               </a:rPr>
-              <a:t>Why</a:t>
+              <a:t>Pattern</a:t>
             </a:r>
             <a:r>
               <a:rPr kumimoji="0" lang="en-US" sz="4000" b="0" i="0" u="none" strike="noStrike" kern="0" cap="all" spc="0" normalizeH="0" noProof="0" dirty="0" smtClean="0">
@@ -12131,7 +12401,7 @@
                 <a:ea typeface="+mj-ea"/>
                 <a:cs typeface="+mj-cs"/>
               </a:rPr>
-              <a:t> is it good?</a:t>
+              <a:t> Matching</a:t>
             </a:r>
             <a:endParaRPr kumimoji="0" lang="en-US" sz="4000" b="0" i="0" u="none" strike="noStrike" kern="0" cap="all" spc="0" normalizeH="0" baseline="0" noProof="0" dirty="0">
               <a:ln>
@@ -12152,59 +12422,6 @@
               <a:latin typeface="+mj-lt"/>
               <a:ea typeface="+mj-ea"/>
               <a:cs typeface="+mj-cs"/>
-            </a:endParaRPr>
-          </a:p>
-        </p:txBody>
-      </p:sp>
-      <p:sp>
-        <p:nvSpPr>
-          <p:cNvPr id="5" name="Text Box 16"/>
-          <p:cNvSpPr txBox="1">
-            <a:spLocks noChangeArrowheads="1"/>
-          </p:cNvSpPr>
-          <p:nvPr/>
-        </p:nvSpPr>
-        <p:spPr bwMode="auto">
-          <a:xfrm>
-            <a:off x="1219200" y="3043535"/>
-            <a:ext cx="6832320" cy="461665"/>
-          </a:xfrm>
-          <a:prstGeom prst="rect">
-            <a:avLst/>
-          </a:prstGeom>
-          <a:noFill/>
-          <a:ln w="9525">
-            <a:noFill/>
-            <a:miter lim="800000"/>
-            <a:headEnd/>
-            <a:tailEnd/>
-          </a:ln>
-          <a:effectLst/>
-        </p:spPr>
-        <p:txBody>
-          <a:bodyPr wrap="none">
-            <a:spAutoFit/>
-          </a:bodyPr>
-          <a:lstStyle/>
-          <a:p>
-            <a:r>
-              <a:rPr lang="en-US" sz="2400" dirty="0" smtClean="0">
-                <a:solidFill>
-                  <a:schemeClr val="accent4">
-                    <a:lumMod val="60000"/>
-                    <a:lumOff val="40000"/>
-                  </a:schemeClr>
-                </a:solidFill>
-              </a:rPr>
-              <a:t>2.  Helps get you out of the procedural mindset</a:t>
-            </a:r>
-            <a:endParaRPr lang="en-US" sz="2400" dirty="0">
-              <a:solidFill>
-                <a:schemeClr val="accent4">
-                  <a:lumMod val="60000"/>
-                  <a:lumOff val="40000"/>
-                </a:schemeClr>
-              </a:solidFill>
             </a:endParaRPr>
           </a:p>
         </p:txBody>
@@ -12772,7 +12989,7 @@
         <p:spPr bwMode="auto">
           <a:xfrm>
             <a:off x="1235075" y="2438400"/>
-            <a:ext cx="5759910" cy="461665"/>
+            <a:ext cx="5325497" cy="461665"/>
           </a:xfrm>
           <a:prstGeom prst="rect">
             <a:avLst/>
@@ -12801,29 +13018,7 @@
                   </a:schemeClr>
                 </a:solidFill>
               </a:rPr>
-              <a:t>1.  MVC Template </a:t>
-            </a:r>
-            <a:r>
-              <a:rPr lang="en-US" sz="2400" dirty="0" smtClean="0">
-                <a:solidFill>
-                  <a:schemeClr val="accent4">
-                    <a:lumMod val="60000"/>
-                    <a:lumOff val="40000"/>
-                  </a:schemeClr>
-                </a:solidFill>
-              </a:rPr>
-              <a:t>(</a:t>
-            </a:r>
-            <a:r>
-              <a:rPr lang="en-US" sz="2400" smtClean="0">
-                <a:solidFill>
-                  <a:schemeClr val="accent4">
-                    <a:lumMod val="60000"/>
-                    <a:lumOff val="40000"/>
-                  </a:schemeClr>
-                </a:solidFill>
-              </a:rPr>
-              <a:t>Account Controller)</a:t>
+              <a:t>1.  Makes your code easier to extend</a:t>
             </a:r>
             <a:endParaRPr lang="en-US" sz="2400" dirty="0">
               <a:solidFill>
@@ -12895,7 +13090,30 @@
                 <a:ea typeface="+mj-ea"/>
                 <a:cs typeface="+mj-cs"/>
               </a:rPr>
-              <a:t>Examples</a:t>
+              <a:t>Why</a:t>
+            </a:r>
+            <a:r>
+              <a:rPr kumimoji="0" lang="en-US" sz="4000" b="0" i="0" u="none" strike="noStrike" kern="0" cap="all" spc="0" normalizeH="0" noProof="0" dirty="0" smtClean="0">
+                <a:ln>
+                  <a:noFill/>
+                </a:ln>
+                <a:solidFill>
+                  <a:schemeClr val="tx2"/>
+                </a:solidFill>
+                <a:effectLst>
+                  <a:outerShdw blurRad="51000" dist="37000" dir="5400000" algn="tl" rotWithShape="0">
+                    <a:srgbClr val="000000">
+                      <a:alpha val="25000"/>
+                    </a:srgbClr>
+                  </a:outerShdw>
+                </a:effectLst>
+                <a:uLnTx/>
+                <a:uFillTx/>
+                <a:latin typeface="+mj-lt"/>
+                <a:ea typeface="+mj-ea"/>
+                <a:cs typeface="+mj-cs"/>
+              </a:rPr>
+              <a:t> is it good?</a:t>
             </a:r>
             <a:endParaRPr kumimoji="0" lang="en-US" sz="4000" b="0" i="0" u="none" strike="noStrike" kern="0" cap="all" spc="0" normalizeH="0" baseline="0" noProof="0" dirty="0">
               <a:ln>
@@ -12920,6 +13138,59 @@
           </a:p>
         </p:txBody>
       </p:sp>
+      <p:sp>
+        <p:nvSpPr>
+          <p:cNvPr id="5" name="Text Box 16"/>
+          <p:cNvSpPr txBox="1">
+            <a:spLocks noChangeArrowheads="1"/>
+          </p:cNvSpPr>
+          <p:nvPr/>
+        </p:nvSpPr>
+        <p:spPr bwMode="auto">
+          <a:xfrm>
+            <a:off x="1219200" y="3043535"/>
+            <a:ext cx="6832320" cy="461665"/>
+          </a:xfrm>
+          <a:prstGeom prst="rect">
+            <a:avLst/>
+          </a:prstGeom>
+          <a:noFill/>
+          <a:ln w="9525">
+            <a:noFill/>
+            <a:miter lim="800000"/>
+            <a:headEnd/>
+            <a:tailEnd/>
+          </a:ln>
+          <a:effectLst/>
+        </p:spPr>
+        <p:txBody>
+          <a:bodyPr wrap="none">
+            <a:spAutoFit/>
+          </a:bodyPr>
+          <a:lstStyle/>
+          <a:p>
+            <a:r>
+              <a:rPr lang="en-US" sz="2400" dirty="0" smtClean="0">
+                <a:solidFill>
+                  <a:schemeClr val="accent4">
+                    <a:lumMod val="60000"/>
+                    <a:lumOff val="40000"/>
+                  </a:schemeClr>
+                </a:solidFill>
+              </a:rPr>
+              <a:t>2.  Helps get you out of the procedural mindset</a:t>
+            </a:r>
+            <a:endParaRPr lang="en-US" sz="2400" dirty="0">
+              <a:solidFill>
+                <a:schemeClr val="accent4">
+                  <a:lumMod val="60000"/>
+                  <a:lumOff val="40000"/>
+                </a:schemeClr>
+              </a:solidFill>
+            </a:endParaRPr>
+          </a:p>
+        </p:txBody>
+      </p:sp>
     </p:spTree>
   </p:cSld>
   <p:clrMapOvr>
@@ -12939,6 +13210,208 @@
 </file>
 
 <file path=ppt/slides/slide21.xml><?xml version="1.0" encoding="utf-8"?>
+<p:sld xmlns:a="http://schemas.openxmlformats.org/drawingml/2006/main" xmlns:r="http://schemas.openxmlformats.org/officeDocument/2006/relationships" xmlns:p="http://schemas.openxmlformats.org/presentationml/2006/main">
+  <p:cSld>
+    <p:spTree>
+      <p:nvGrpSpPr>
+        <p:cNvPr id="1" name=""/>
+        <p:cNvGrpSpPr/>
+        <p:nvPr/>
+      </p:nvGrpSpPr>
+      <p:grpSpPr>
+        <a:xfrm>
+          <a:off x="0" y="0"/>
+          <a:ext cx="0" cy="0"/>
+          <a:chOff x="0" y="0"/>
+          <a:chExt cx="0" cy="0"/>
+        </a:xfrm>
+      </p:grpSpPr>
+      <p:sp>
+        <p:nvSpPr>
+          <p:cNvPr id="3" name="Text Placeholder 2"/>
+          <p:cNvSpPr>
+            <a:spLocks noGrp="1"/>
+          </p:cNvSpPr>
+          <p:nvPr>
+            <p:ph type="body" sz="quarter" idx="11"/>
+          </p:nvPr>
+        </p:nvSpPr>
+        <p:spPr/>
+        <p:txBody>
+          <a:bodyPr/>
+          <a:lstStyle/>
+          <a:p>
+            <a:endParaRPr lang="en-US"/>
+          </a:p>
+        </p:txBody>
+      </p:sp>
+      <p:sp>
+        <p:nvSpPr>
+          <p:cNvPr id="9" name="Text Box 16"/>
+          <p:cNvSpPr txBox="1">
+            <a:spLocks noChangeArrowheads="1"/>
+          </p:cNvSpPr>
+          <p:nvPr/>
+        </p:nvSpPr>
+        <p:spPr bwMode="auto">
+          <a:xfrm>
+            <a:off x="1235075" y="2438400"/>
+            <a:ext cx="5759910" cy="461665"/>
+          </a:xfrm>
+          <a:prstGeom prst="rect">
+            <a:avLst/>
+          </a:prstGeom>
+          <a:noFill/>
+          <a:ln w="9525">
+            <a:noFill/>
+            <a:miter lim="800000"/>
+            <a:headEnd/>
+            <a:tailEnd/>
+          </a:ln>
+          <a:effectLst/>
+        </p:spPr>
+        <p:txBody>
+          <a:bodyPr wrap="none">
+            <a:spAutoFit/>
+          </a:bodyPr>
+          <a:lstStyle/>
+          <a:p>
+            <a:r>
+              <a:rPr lang="en-US" sz="2400" dirty="0" smtClean="0">
+                <a:solidFill>
+                  <a:schemeClr val="accent4">
+                    <a:lumMod val="60000"/>
+                    <a:lumOff val="40000"/>
+                  </a:schemeClr>
+                </a:solidFill>
+              </a:rPr>
+              <a:t>1.  MVC Template (</a:t>
+            </a:r>
+            <a:r>
+              <a:rPr lang="en-US" sz="2400" smtClean="0">
+                <a:solidFill>
+                  <a:schemeClr val="accent4">
+                    <a:lumMod val="60000"/>
+                    <a:lumOff val="40000"/>
+                  </a:schemeClr>
+                </a:solidFill>
+              </a:rPr>
+              <a:t>Account Controller)</a:t>
+            </a:r>
+            <a:endParaRPr lang="en-US" sz="2400" dirty="0">
+              <a:solidFill>
+                <a:schemeClr val="accent4">
+                  <a:lumMod val="60000"/>
+                  <a:lumOff val="40000"/>
+                </a:schemeClr>
+              </a:solidFill>
+            </a:endParaRPr>
+          </a:p>
+        </p:txBody>
+      </p:sp>
+      <p:sp>
+        <p:nvSpPr>
+          <p:cNvPr id="11" name="Rectangle 6"/>
+          <p:cNvSpPr txBox="1">
+            <a:spLocks noChangeArrowheads="1"/>
+          </p:cNvSpPr>
+          <p:nvPr/>
+        </p:nvSpPr>
+        <p:spPr>
+          <a:xfrm>
+            <a:off x="304800" y="304800"/>
+            <a:ext cx="8839200" cy="838200"/>
+          </a:xfrm>
+          <a:prstGeom prst="rect">
+            <a:avLst/>
+          </a:prstGeom>
+        </p:spPr>
+        <p:txBody>
+          <a:bodyPr/>
+          <a:lstStyle/>
+          <a:p>
+            <a:pPr marL="0" marR="0" lvl="0" indent="0" algn="l" defTabSz="914400" rtl="0" eaLnBrk="1" fontAlgn="auto" latinLnBrk="0" hangingPunct="1">
+              <a:lnSpc>
+                <a:spcPct val="100000"/>
+              </a:lnSpc>
+              <a:spcBef>
+                <a:spcPct val="0"/>
+              </a:spcBef>
+              <a:spcAft>
+                <a:spcPts val="0"/>
+              </a:spcAft>
+              <a:buClrTx/>
+              <a:buSzTx/>
+              <a:buFontTx/>
+              <a:buNone/>
+              <a:tabLst/>
+              <a:defRPr/>
+            </a:pPr>
+            <a:r>
+              <a:rPr kumimoji="0" lang="en-US" sz="4000" b="0" i="0" u="none" strike="noStrike" kern="0" cap="all" spc="0" normalizeH="0" baseline="0" noProof="0" dirty="0" smtClean="0">
+                <a:ln>
+                  <a:noFill/>
+                </a:ln>
+                <a:solidFill>
+                  <a:schemeClr val="tx2"/>
+                </a:solidFill>
+                <a:effectLst>
+                  <a:outerShdw blurRad="51000" dist="37000" dir="5400000" algn="tl" rotWithShape="0">
+                    <a:srgbClr val="000000">
+                      <a:alpha val="25000"/>
+                    </a:srgbClr>
+                  </a:outerShdw>
+                </a:effectLst>
+                <a:uLnTx/>
+                <a:uFillTx/>
+                <a:latin typeface="+mj-lt"/>
+                <a:ea typeface="+mj-ea"/>
+                <a:cs typeface="+mj-cs"/>
+              </a:rPr>
+              <a:t>Examples</a:t>
+            </a:r>
+            <a:endParaRPr kumimoji="0" lang="en-US" sz="4000" b="0" i="0" u="none" strike="noStrike" kern="0" cap="all" spc="0" normalizeH="0" baseline="0" noProof="0" dirty="0">
+              <a:ln>
+                <a:noFill/>
+              </a:ln>
+              <a:solidFill>
+                <a:schemeClr val="tx2"/>
+              </a:solidFill>
+              <a:effectLst>
+                <a:outerShdw blurRad="51000" dist="37000" dir="5400000" algn="tl" rotWithShape="0">
+                  <a:srgbClr val="000000">
+                    <a:alpha val="25000"/>
+                  </a:srgbClr>
+                </a:outerShdw>
+              </a:effectLst>
+              <a:uLnTx/>
+              <a:uFillTx/>
+              <a:latin typeface="+mj-lt"/>
+              <a:ea typeface="+mj-ea"/>
+              <a:cs typeface="+mj-cs"/>
+            </a:endParaRPr>
+          </a:p>
+        </p:txBody>
+      </p:sp>
+    </p:spTree>
+  </p:cSld>
+  <p:clrMapOvr>
+    <a:masterClrMapping/>
+  </p:clrMapOvr>
+  <p:transition>
+    <p:fade/>
+  </p:transition>
+  <p:timing>
+    <p:tnLst>
+      <p:par>
+        <p:cTn id="1" dur="indefinite" restart="never" nodeType="tmRoot"/>
+      </p:par>
+    </p:tnLst>
+  </p:timing>
+</p:sld>
+</file>
+
+<file path=ppt/slides/slide22.xml><?xml version="1.0" encoding="utf-8"?>
 <p:sld xmlns:a="http://schemas.openxmlformats.org/drawingml/2006/main" xmlns:r="http://schemas.openxmlformats.org/officeDocument/2006/relationships" xmlns:p="http://schemas.openxmlformats.org/presentationml/2006/main">
   <p:cSld>
     <p:spTree>

</xml_diff>